<commit_message>
Web : mise en forme / typos
</commit_message>
<xml_diff>
--- a/web/2-HTML/html.pptx
+++ b/web/2-HTML/html.pptx
@@ -221,7 +221,7 @@
           <a:p>
             <a:fld id="{5EB47243-285B-2741-8C7D-C88258D9CCFA}" type="datetimeFigureOut">
               <a:rPr lang="fr-FR" smtClean="0"/>
-              <a:t>03/06/2019</a:t>
+              <a:t>05/06/2019</a:t>
             </a:fld>
             <a:endParaRPr lang="fr-FR"/>
           </a:p>
@@ -287,7 +287,7 @@
           <a:p>
             <a:fld id="{C5CA9166-BC48-2C47-B9BF-6F57720E77B8}" type="slidenum">
               <a:rPr lang="fr-FR" smtClean="0"/>
-              <a:t>‹N°›</a:t>
+              <a:t>‹#›</a:t>
             </a:fld>
             <a:endParaRPr lang="fr-FR"/>
           </a:p>
@@ -387,7 +387,7 @@
           <a:p>
             <a:fld id="{7D088D39-B4EA-D24B-B9C3-6A64886EABE2}" type="datetimeFigureOut">
               <a:rPr lang="fr-FR" smtClean="0"/>
-              <a:t>03/06/2019</a:t>
+              <a:t>05/06/2019</a:t>
             </a:fld>
             <a:endParaRPr lang="fr-FR"/>
           </a:p>
@@ -545,7 +545,7 @@
           <a:p>
             <a:fld id="{1C0E2CBA-6097-B848-A7DA-4D7BD6EB303B}" type="slidenum">
               <a:rPr lang="fr-FR" smtClean="0"/>
-              <a:t>‹N°›</a:t>
+              <a:t>‹#›</a:t>
             </a:fld>
             <a:endParaRPr lang="fr-FR"/>
           </a:p>
@@ -2181,7 +2181,7 @@
           <a:p>
             <a:fld id="{BB2FA04C-1355-4CE6-8050-4BD994E23BD5}" type="datetime4">
               <a:rPr lang="fr-FR" smtClean="0"/>
-              <a:t>3 juin 2019</a:t>
+              <a:t>5 juin 2019</a:t>
             </a:fld>
             <a:endParaRPr lang="fr-FR" dirty="0"/>
           </a:p>
@@ -2259,7 +2259,7 @@
             <a:fld id="{DCE37727-CC04-7A46-938D-2CCFF056F773}" type="slidenum">
               <a:rPr lang="fr-FR" smtClean="0"/>
               <a:pPr/>
-              <a:t>‹N°›</a:t>
+              <a:t>‹#›</a:t>
             </a:fld>
             <a:endParaRPr lang="fr-FR"/>
           </a:p>
@@ -2768,7 +2768,7 @@
           <a:p>
             <a:fld id="{A81C4219-47FF-4375-968D-EABA4A212953}" type="datetime4">
               <a:rPr lang="fr-FR" smtClean="0"/>
-              <a:t>3 juin 2019</a:t>
+              <a:t>5 juin 2019</a:t>
             </a:fld>
             <a:endParaRPr lang="fr-FR" dirty="0"/>
           </a:p>
@@ -2846,7 +2846,7 @@
             <a:fld id="{DCE37727-CC04-7A46-938D-2CCFF056F773}" type="slidenum">
               <a:rPr lang="fr-FR" smtClean="0"/>
               <a:pPr/>
-              <a:t>‹N°›</a:t>
+              <a:t>‹#›</a:t>
             </a:fld>
             <a:endParaRPr lang="fr-FR"/>
           </a:p>
@@ -4604,7 +4604,7 @@
           <a:p>
             <a:fld id="{81E3CCF4-D669-4BB6-B0BE-EE495E88AE6B}" type="datetime4">
               <a:rPr lang="fr-FR" smtClean="0"/>
-              <a:t>3 juin 2019</a:t>
+              <a:t>5 juin 2019</a:t>
             </a:fld>
             <a:endParaRPr lang="fr-FR" dirty="0"/>
           </a:p>
@@ -4682,7 +4682,7 @@
             <a:fld id="{DCE37727-CC04-7A46-938D-2CCFF056F773}" type="slidenum">
               <a:rPr lang="fr-FR" smtClean="0"/>
               <a:pPr/>
-              <a:t>‹N°›</a:t>
+              <a:t>‹#›</a:t>
             </a:fld>
             <a:endParaRPr lang="fr-FR"/>
           </a:p>
@@ -5540,7 +5540,7 @@
           <a:p>
             <a:fld id="{2E52B8B1-858B-4633-AE57-5B6CA9292F2B}" type="datetime4">
               <a:rPr lang="fr-FR" smtClean="0"/>
-              <a:t>3 juin 2019</a:t>
+              <a:t>5 juin 2019</a:t>
             </a:fld>
             <a:endParaRPr lang="fr-FR" dirty="0"/>
           </a:p>
@@ -5618,7 +5618,7 @@
             <a:fld id="{DCE37727-CC04-7A46-938D-2CCFF056F773}" type="slidenum">
               <a:rPr lang="fr-FR" smtClean="0"/>
               <a:pPr/>
-              <a:t>‹N°›</a:t>
+              <a:t>‹#›</a:t>
             </a:fld>
             <a:endParaRPr lang="fr-FR"/>
           </a:p>
@@ -6172,7 +6172,7 @@
           <a:p>
             <a:fld id="{BB2FA04C-1355-4CE6-8050-4BD994E23BD5}" type="datetime4">
               <a:rPr lang="fr-FR" smtClean="0"/>
-              <a:t>3 juin 2019</a:t>
+              <a:t>5 juin 2019</a:t>
             </a:fld>
             <a:endParaRPr lang="fr-FR" dirty="0"/>
           </a:p>
@@ -6483,7 +6483,7 @@
           <a:p>
             <a:fld id="{BB2FA04C-1355-4CE6-8050-4BD994E23BD5}" type="datetime4">
               <a:rPr lang="fr-FR" smtClean="0"/>
-              <a:t>3 juin 2019</a:t>
+              <a:t>5 juin 2019</a:t>
             </a:fld>
             <a:endParaRPr lang="fr-FR" dirty="0"/>
           </a:p>
@@ -6702,7 +6702,7 @@
           <a:p>
             <a:fld id="{1AC11C67-BE04-4C5F-B0EE-E01220C9093A}" type="datetime4">
               <a:rPr lang="fr-FR" smtClean="0"/>
-              <a:t>3 juin 2019</a:t>
+              <a:t>5 juin 2019</a:t>
             </a:fld>
             <a:endParaRPr lang="fr-FR" dirty="0"/>
           </a:p>
@@ -7167,7 +7167,7 @@
           <a:p>
             <a:fld id="{1AC11C67-BE04-4C5F-B0EE-E01220C9093A}" type="datetime4">
               <a:rPr lang="fr-FR" smtClean="0"/>
-              <a:t>3 juin 2019</a:t>
+              <a:t>5 juin 2019</a:t>
             </a:fld>
             <a:endParaRPr lang="fr-FR" dirty="0"/>
           </a:p>
@@ -7884,7 +7884,7 @@
           <a:p>
             <a:fld id="{BB2FA04C-1355-4CE6-8050-4BD994E23BD5}" type="datetime4">
               <a:rPr lang="fr-FR" smtClean="0"/>
-              <a:t>3 juin 2019</a:t>
+              <a:t>5 juin 2019</a:t>
             </a:fld>
             <a:endParaRPr lang="fr-FR" dirty="0"/>
           </a:p>
@@ -9079,7 +9079,7 @@
           <a:p>
             <a:fld id="{BB2FA04C-1355-4CE6-8050-4BD994E23BD5}" type="datetime4">
               <a:rPr lang="fr-FR" smtClean="0"/>
-              <a:t>3 juin 2019</a:t>
+              <a:t>5 juin 2019</a:t>
             </a:fld>
             <a:endParaRPr lang="fr-FR" dirty="0"/>
           </a:p>
@@ -9496,7 +9496,7 @@
             </a:pPr>
             <a:r>
               <a:rPr lang="fr-FR" sz="2400" dirty="0">
-                <a:latin typeface="Source Code Pro" panose="020B0509030403020204" pitchFamily="49" charset="0"/>
+                <a:latin typeface="+mj-lt"/>
                 <a:ea typeface="Source Code Pro" panose="020B0509030403020204" pitchFamily="49" charset="0"/>
               </a:rPr>
               <a:t>Image</a:t>
@@ -9521,7 +9521,7 @@
             </a:pPr>
             <a:r>
               <a:rPr lang="fr-FR" sz="2400" dirty="0">
-                <a:latin typeface="Source Code Pro" panose="020B0509030403020204" pitchFamily="49" charset="0"/>
+                <a:latin typeface="+mj-lt"/>
                 <a:ea typeface="Source Code Pro" panose="020B0509030403020204" pitchFamily="49" charset="0"/>
               </a:rPr>
               <a:t>Faire attention à la taille des images</a:t>
@@ -9535,7 +9535,7 @@
             </a:pPr>
             <a:r>
               <a:rPr lang="fr-FR" sz="2000" dirty="0">
-                <a:latin typeface="Source Code Pro" panose="020B0509030403020204" pitchFamily="49" charset="0"/>
+                <a:latin typeface="+mj-lt"/>
                 <a:ea typeface="Source Code Pro" panose="020B0509030403020204" pitchFamily="49" charset="0"/>
               </a:rPr>
               <a:t>Redimensionnement possible côté client</a:t>
@@ -9549,10 +9549,10 @@
             </a:pPr>
             <a:r>
               <a:rPr lang="fr-FR" sz="2000" dirty="0">
-                <a:latin typeface="Source Code Pro" panose="020B0509030403020204" pitchFamily="49" charset="0"/>
+                <a:latin typeface="+mj-lt"/>
                 <a:ea typeface="Source Code Pro" panose="020B0509030403020204" pitchFamily="49" charset="0"/>
               </a:rPr>
-              <a:t>… mais téléchargement nécessaire depuis le serveur</a:t>
+              <a:t>…mais téléchargement nécessaire depuis le serveur</a:t>
             </a:r>
           </a:p>
           <a:p>
@@ -9601,7 +9601,7 @@
           <a:p>
             <a:fld id="{BB2FA04C-1355-4CE6-8050-4BD994E23BD5}" type="datetime4">
               <a:rPr lang="fr-FR" smtClean="0"/>
-              <a:t>3 juin 2019</a:t>
+              <a:t>5 juin 2019</a:t>
             </a:fld>
             <a:endParaRPr lang="fr-FR" dirty="0"/>
           </a:p>
@@ -10116,7 +10116,7 @@
           <a:p>
             <a:fld id="{BB2FA04C-1355-4CE6-8050-4BD994E23BD5}" type="datetime4">
               <a:rPr lang="fr-FR" smtClean="0"/>
-              <a:t>3 juin 2019</a:t>
+              <a:t>5 juin 2019</a:t>
             </a:fld>
             <a:endParaRPr lang="fr-FR" dirty="0"/>
           </a:p>
@@ -10292,7 +10292,7 @@
           <a:p>
             <a:fld id="{BB2FA04C-1355-4CE6-8050-4BD994E23BD5}" type="datetime4">
               <a:rPr lang="fr-FR" smtClean="0"/>
-              <a:t>3 juin 2019</a:t>
+              <a:t>5 juin 2019</a:t>
             </a:fld>
             <a:endParaRPr lang="fr-FR" dirty="0"/>
           </a:p>

</xml_diff>

<commit_message>
Web : éléments sémantiques v2
</commit_message>
<xml_diff>
--- a/web/2-HTML/html.pptx
+++ b/web/2-HTML/html.pptx
@@ -6772,10 +6772,15 @@
             <p:ph sz="half" idx="1"/>
           </p:nvPr>
         </p:nvSpPr>
-        <p:spPr/>
+        <p:spPr>
+          <a:xfrm>
+            <a:off x="457200" y="1092425"/>
+            <a:ext cx="8229600" cy="5460775"/>
+          </a:xfrm>
+        </p:spPr>
         <p:txBody>
           <a:bodyPr>
-            <a:normAutofit lnSpcReduction="10000"/>
+            <a:normAutofit/>
           </a:bodyPr>
           <a:lstStyle/>
           <a:p>
@@ -6830,9 +6835,9 @@
           </a:p>
           <a:p>
             <a:pPr marL="400050" indent="-400050">
-              <a:lnSpc>
-                <a:spcPct val="150000"/>
-              </a:lnSpc>
+              <a:spcBef>
+                <a:spcPts val="1200"/>
+              </a:spcBef>
             </a:pPr>
             <a:r>
               <a:rPr lang="fr-FR" sz="2400" dirty="0"/>
@@ -6845,44 +6850,64 @@
           </a:p>
           <a:p>
             <a:pPr lvl="1"/>
+            <a:r>
+              <a:rPr lang="fr-FR" sz="2000" dirty="0">
+                <a:latin typeface="+mj-lt"/>
+                <a:ea typeface="Source Code Pro" panose="020B0509030403020204" pitchFamily="49" charset="0"/>
+              </a:rPr>
+              <a:t>Fichier texte d’extension </a:t>
+            </a:r>
+            <a:r>
+              <a:rPr lang="fr-FR" sz="2000" b="1" dirty="0">
+                <a:latin typeface="+mj-lt"/>
+                <a:ea typeface="Source Code Pro" panose="020B0509030403020204" pitchFamily="49" charset="0"/>
+              </a:rPr>
+              <a:t>html </a:t>
+            </a:r>
             <a:r>
               <a:rPr lang="fr-FR" sz="2000" dirty="0">
                 <a:latin typeface="Source Code Pro" panose="020B0509030403020204" pitchFamily="49" charset="0"/>
                 <a:ea typeface="Source Code Pro" panose="020B0509030403020204" pitchFamily="49" charset="0"/>
               </a:rPr>
-              <a:t>Fichier texte d’extension </a:t>
-            </a:r>
-            <a:r>
-              <a:rPr lang="fr-FR" sz="2000" b="1" dirty="0">
+              <a:t>(</a:t>
+            </a:r>
+            <a:r>
+              <a:rPr lang="fr-FR" sz="2000" dirty="0" err="1">
                 <a:latin typeface="Source Code Pro" panose="020B0509030403020204" pitchFamily="49" charset="0"/>
                 <a:ea typeface="Source Code Pro" panose="020B0509030403020204" pitchFamily="49" charset="0"/>
               </a:rPr>
-              <a:t>html </a:t>
+              <a:t>index.html</a:t>
             </a:r>
             <a:r>
               <a:rPr lang="fr-FR" sz="2000" dirty="0">
                 <a:latin typeface="Source Code Pro" panose="020B0509030403020204" pitchFamily="49" charset="0"/>
                 <a:ea typeface="Source Code Pro" panose="020B0509030403020204" pitchFamily="49" charset="0"/>
               </a:rPr>
-              <a:t>(</a:t>
-            </a:r>
-            <a:r>
-              <a:rPr lang="fr-FR" sz="2000" dirty="0" err="1">
+              <a:t>)</a:t>
+            </a:r>
+          </a:p>
+          <a:p>
+            <a:pPr lvl="1"/>
+            <a:r>
+              <a:rPr lang="fr-FR" sz="2000" dirty="0">
+                <a:solidFill>
+                  <a:srgbClr val="990000"/>
+                </a:solidFill>
                 <a:latin typeface="Source Code Pro" panose="020B0509030403020204" pitchFamily="49" charset="0"/>
                 <a:ea typeface="Source Code Pro" panose="020B0509030403020204" pitchFamily="49" charset="0"/>
               </a:rPr>
-              <a:t>index.html</a:t>
-            </a:r>
-            <a:r>
-              <a:rPr lang="fr-FR" sz="2000" dirty="0">
+              <a:t>&lt;</a:t>
+            </a:r>
+            <a:r>
+              <a:rPr lang="fr-FR" sz="2000" dirty="0" err="1">
+                <a:solidFill>
+                  <a:srgbClr val="990000"/>
+                </a:solidFill>
                 <a:latin typeface="Source Code Pro" panose="020B0509030403020204" pitchFamily="49" charset="0"/>
                 <a:ea typeface="Source Code Pro" panose="020B0509030403020204" pitchFamily="49" charset="0"/>
               </a:rPr>
-              <a:t>)</a:t>
-            </a:r>
-          </a:p>
-          <a:p>
-            <a:pPr lvl="1"/>
+              <a:t>nomBalise</a:t>
+            </a:r>
             <a:r>
               <a:rPr lang="fr-FR" sz="2000" dirty="0">
                 <a:solidFill>
@@ -6891,17 +6916,17 @@
                 <a:latin typeface="Source Code Pro" panose="020B0509030403020204" pitchFamily="49" charset="0"/>
                 <a:ea typeface="Source Code Pro" panose="020B0509030403020204" pitchFamily="49" charset="0"/>
               </a:rPr>
-              <a:t>&lt;</a:t>
-            </a:r>
-            <a:r>
-              <a:rPr lang="fr-FR" sz="2000" dirty="0" err="1">
-                <a:solidFill>
-                  <a:srgbClr val="990000"/>
+              <a:t>&gt;</a:t>
+            </a:r>
+            <a:r>
+              <a:rPr lang="fr-FR" sz="2000" dirty="0">
+                <a:solidFill>
+                  <a:srgbClr val="657B83"/>
                 </a:solidFill>
                 <a:latin typeface="Source Code Pro" panose="020B0509030403020204" pitchFamily="49" charset="0"/>
                 <a:ea typeface="Source Code Pro" panose="020B0509030403020204" pitchFamily="49" charset="0"/>
               </a:rPr>
-              <a:t>nomBalise</a:t>
+              <a:t>...</a:t>
             </a:r>
             <a:r>
               <a:rPr lang="fr-FR" sz="2000" dirty="0">
@@ -6911,17 +6936,17 @@
                 <a:latin typeface="Source Code Pro" panose="020B0509030403020204" pitchFamily="49" charset="0"/>
                 <a:ea typeface="Source Code Pro" panose="020B0509030403020204" pitchFamily="49" charset="0"/>
               </a:rPr>
-              <a:t>&gt;</a:t>
-            </a:r>
-            <a:r>
-              <a:rPr lang="fr-FR" sz="2000" dirty="0">
-                <a:solidFill>
-                  <a:srgbClr val="657B83"/>
+              <a:t>&lt;/</a:t>
+            </a:r>
+            <a:r>
+              <a:rPr lang="fr-FR" sz="2000" dirty="0" err="1">
+                <a:solidFill>
+                  <a:srgbClr val="990000"/>
                 </a:solidFill>
                 <a:latin typeface="Source Code Pro" panose="020B0509030403020204" pitchFamily="49" charset="0"/>
                 <a:ea typeface="Source Code Pro" panose="020B0509030403020204" pitchFamily="49" charset="0"/>
               </a:rPr>
-              <a:t>...</a:t>
+              <a:t>nomBalise</a:t>
             </a:r>
             <a:r>
               <a:rPr lang="fr-FR" sz="2000" dirty="0">
@@ -6931,81 +6956,81 @@
                 <a:latin typeface="Source Code Pro" panose="020B0509030403020204" pitchFamily="49" charset="0"/>
                 <a:ea typeface="Source Code Pro" panose="020B0509030403020204" pitchFamily="49" charset="0"/>
               </a:rPr>
-              <a:t>&lt;/</a:t>
-            </a:r>
-            <a:r>
-              <a:rPr lang="fr-FR" sz="2000" dirty="0" err="1">
+              <a:t>&gt;</a:t>
+            </a:r>
+            <a:r>
+              <a:rPr lang="fr-FR" sz="2000" dirty="0">
+                <a:solidFill>
+                  <a:srgbClr val="990000"/>
+                </a:solidFill>
+                <a:latin typeface="+mj-lt"/>
+                <a:ea typeface="Source Code Pro" panose="020B0509030403020204" pitchFamily="49" charset="0"/>
+              </a:rPr>
+              <a:t>  </a:t>
+            </a:r>
+            <a:r>
+              <a:rPr lang="fr-FR" sz="2000" dirty="0">
+                <a:latin typeface="+mj-lt"/>
+                <a:ea typeface="Source Code Pro" panose="020B0509030403020204" pitchFamily="49" charset="0"/>
+              </a:rPr>
+              <a:t>ou</a:t>
+            </a:r>
+            <a:r>
+              <a:rPr lang="fr-FR" sz="2000" dirty="0">
+                <a:solidFill>
+                  <a:srgbClr val="990000"/>
+                </a:solidFill>
+                <a:latin typeface="+mj-lt"/>
+                <a:ea typeface="Source Code Pro" panose="020B0509030403020204" pitchFamily="49" charset="0"/>
+              </a:rPr>
+              <a:t> </a:t>
+            </a:r>
+            <a:r>
+              <a:rPr lang="fr-FR" sz="2000" dirty="0">
                 <a:solidFill>
                   <a:srgbClr val="990000"/>
                 </a:solidFill>
                 <a:latin typeface="Source Code Pro" panose="020B0509030403020204" pitchFamily="49" charset="0"/>
                 <a:ea typeface="Source Code Pro" panose="020B0509030403020204" pitchFamily="49" charset="0"/>
               </a:rPr>
-              <a:t>nomBalise</a:t>
-            </a:r>
-            <a:r>
-              <a:rPr lang="fr-FR" sz="2000" dirty="0">
+              <a:t>&lt;</a:t>
+            </a:r>
+            <a:r>
+              <a:rPr lang="fr-FR" sz="2000" dirty="0" err="1">
                 <a:solidFill>
                   <a:srgbClr val="990000"/>
                 </a:solidFill>
                 <a:latin typeface="Source Code Pro" panose="020B0509030403020204" pitchFamily="49" charset="0"/>
                 <a:ea typeface="Source Code Pro" panose="020B0509030403020204" pitchFamily="49" charset="0"/>
               </a:rPr>
-              <a:t>&gt;  </a:t>
+              <a:t>nomBalise</a:t>
             </a:r>
             <a:r>
               <a:rPr lang="fr-FR" sz="2000" dirty="0">
+                <a:solidFill>
+                  <a:srgbClr val="990000"/>
+                </a:solidFill>
                 <a:latin typeface="Source Code Pro" panose="020B0509030403020204" pitchFamily="49" charset="0"/>
                 <a:ea typeface="Source Code Pro" panose="020B0509030403020204" pitchFamily="49" charset="0"/>
               </a:rPr>
-              <a:t>ou</a:t>
-            </a:r>
+              <a:t>/&gt;</a:t>
+            </a:r>
+          </a:p>
+          <a:p>
+            <a:pPr lvl="1"/>
             <a:r>
               <a:rPr lang="fr-FR" sz="2000" dirty="0">
-                <a:solidFill>
-                  <a:srgbClr val="990000"/>
-                </a:solidFill>
-                <a:latin typeface="Source Code Pro" panose="020B0509030403020204" pitchFamily="49" charset="0"/>
+                <a:latin typeface="+mj-lt"/>
                 <a:ea typeface="Source Code Pro" panose="020B0509030403020204" pitchFamily="49" charset="0"/>
               </a:rPr>
-              <a:t> &lt;</a:t>
-            </a:r>
-            <a:r>
-              <a:rPr lang="fr-FR" sz="2000" dirty="0" err="1">
-                <a:solidFill>
-                  <a:srgbClr val="990000"/>
-                </a:solidFill>
-                <a:latin typeface="Source Code Pro" panose="020B0509030403020204" pitchFamily="49" charset="0"/>
-                <a:ea typeface="Source Code Pro" panose="020B0509030403020204" pitchFamily="49" charset="0"/>
-              </a:rPr>
-              <a:t>nomBalise</a:t>
-            </a:r>
-            <a:r>
-              <a:rPr lang="fr-FR" sz="2000" dirty="0">
-                <a:solidFill>
-                  <a:srgbClr val="990000"/>
-                </a:solidFill>
-                <a:latin typeface="Source Code Pro" panose="020B0509030403020204" pitchFamily="49" charset="0"/>
-                <a:ea typeface="Source Code Pro" panose="020B0509030403020204" pitchFamily="49" charset="0"/>
-              </a:rPr>
-              <a:t>/&gt;</a:t>
-            </a:r>
-          </a:p>
-          <a:p>
-            <a:pPr lvl="1"/>
-            <a:r>
-              <a:rPr lang="fr-FR" sz="2000" dirty="0">
-                <a:latin typeface="Source Code Pro" panose="020B0509030403020204" pitchFamily="49" charset="0"/>
-                <a:ea typeface="Source Code Pro" panose="020B0509030403020204" pitchFamily="49" charset="0"/>
-              </a:rPr>
               <a:t>Chaque balise peut avoir des attributs</a:t>
             </a:r>
           </a:p>
           <a:p>
             <a:pPr marL="400050" indent="-400050">
-              <a:lnSpc>
-                <a:spcPct val="150000"/>
-              </a:lnSpc>
+              <a:spcBef>
+                <a:spcPts val="1200"/>
+              </a:spcBef>
             </a:pPr>
             <a:r>
               <a:rPr lang="fr-FR" sz="2400" b="1" dirty="0"/>
@@ -7033,9 +7058,9 @@
           </a:p>
           <a:p>
             <a:pPr marL="400050" indent="-400050">
-              <a:lnSpc>
-                <a:spcPct val="150000"/>
-              </a:lnSpc>
+              <a:spcBef>
+                <a:spcPts val="1200"/>
+              </a:spcBef>
             </a:pPr>
             <a:r>
               <a:rPr lang="fr-FR" dirty="0"/>
@@ -7065,7 +7090,14 @@
             </a:r>
             <a:r>
               <a:rPr lang="fr-FR" dirty="0"/>
-              <a:t> quelque chose même quand le document est mal formé (</a:t>
+              <a:t> quelque chose même quand le document </a:t>
+            </a:r>
+            <a:br>
+              <a:rPr lang="fr-FR" dirty="0"/>
+            </a:br>
+            <a:r>
+              <a:rPr lang="fr-FR" dirty="0"/>
+              <a:t>est mal formé (</a:t>
             </a:r>
             <a:r>
               <a:rPr lang="fr-FR" i="1" dirty="0"/>
@@ -7075,9 +7107,20 @@
               <a:rPr lang="fr-FR" dirty="0"/>
               <a:t>)</a:t>
             </a:r>
-          </a:p>
-          <a:p>
-            <a:endParaRPr lang="fr-FR" sz="2400" dirty="0"/>
+            <a:br>
+              <a:rPr lang="fr-FR" dirty="0"/>
+            </a:br>
+            <a:r>
+              <a:rPr lang="fr-FR" dirty="0"/>
+              <a:t>⇒ outils de validation W3C : </a:t>
+            </a:r>
+            <a:r>
+              <a:rPr lang="fr-FR" dirty="0">
+                <a:hlinkClick r:id="rId3"/>
+              </a:rPr>
+              <a:t>https://validator.w3.org/</a:t>
+            </a:r>
+            <a:endParaRPr lang="fr-FR" dirty="0"/>
           </a:p>
         </p:txBody>
       </p:sp>
@@ -7993,6 +8036,8 @@
                 <a:solidFill>
                   <a:srgbClr val="037F80"/>
                 </a:solidFill>
+                <a:latin typeface="Source Code Pro" panose="020B0509030403020204" pitchFamily="49" charset="0"/>
+                <a:ea typeface="Source Code Pro" panose="020B0509030403020204" pitchFamily="49" charset="0"/>
               </a:rPr>
               <a:t>href</a:t>
             </a:r>
@@ -8027,20 +8072,22 @@
             </a:r>
           </a:p>
           <a:p>
-            <a:endParaRPr lang="fr-FR" dirty="0">
-              <a:latin typeface="Source Code Pro" panose="020B0509030403020204" pitchFamily="49" charset="0"/>
-              <a:ea typeface="Source Code Pro" panose="020B0509030403020204" pitchFamily="49" charset="0"/>
-            </a:endParaRPr>
-          </a:p>
-          <a:p>
+            <a:pPr marL="0" indent="0">
+              <a:buNone/>
+            </a:pPr>
             <a:endParaRPr lang="fr-FR" dirty="0">
               <a:latin typeface="Source Code Pro" panose="020B0509030403020204" pitchFamily="49" charset="0"/>
             </a:endParaRPr>
           </a:p>
           <a:p>
+            <a:pPr>
+              <a:lnSpc>
+                <a:spcPct val="200000"/>
+              </a:lnSpc>
+            </a:pPr>
             <a:r>
               <a:rPr lang="fr-FR" dirty="0">
-                <a:latin typeface="Source Code Pro" panose="020B0509030403020204" pitchFamily="49" charset="0"/>
+                <a:latin typeface="+mj-lt"/>
               </a:rPr>
               <a:t>Lien vers une ancre dans le document</a:t>
             </a:r>
@@ -8343,7 +8390,7 @@
         </p:nvSpPr>
         <p:spPr>
           <a:xfrm>
-            <a:off x="901702" y="5424112"/>
+            <a:off x="901702" y="5181352"/>
             <a:ext cx="7198822" cy="1129088"/>
           </a:xfrm>
           <a:prstGeom prst="rect">
@@ -8694,7 +8741,7 @@
         </p:blipFill>
         <p:spPr>
           <a:xfrm>
-            <a:off x="265176" y="5691329"/>
+            <a:off x="265176" y="5448569"/>
             <a:ext cx="576903" cy="594654"/>
           </a:xfrm>
           <a:prstGeom prst="rect">
@@ -9265,6 +9312,11 @@
             </a:r>
           </a:p>
           <a:p>
+            <a:pPr>
+              <a:spcBef>
+                <a:spcPts val="1200"/>
+              </a:spcBef>
+            </a:pPr>
             <a:r>
               <a:rPr lang="fr-FR" dirty="0"/>
               <a:t>Division de lignes</a:t>
@@ -9309,6 +9361,11 @@
             </a:r>
           </a:p>
           <a:p>
+            <a:pPr>
+              <a:spcBef>
+                <a:spcPts val="1200"/>
+              </a:spcBef>
+            </a:pPr>
             <a:r>
               <a:rPr lang="fr-FR" dirty="0"/>
               <a:t>Liste à puce</a:t>
@@ -10010,27 +10067,7 @@
                 <a:latin typeface="Source Code Pro" panose="020B0509030403020204" pitchFamily="49" charset="0"/>
                 <a:ea typeface="Source Code Pro" panose="020B0509030403020204" pitchFamily="49" charset="0"/>
               </a:rPr>
-              <a:t> /</a:t>
-            </a:r>
-            <a:r>
-              <a:rPr lang="fr-FR" sz="1800" dirty="0" err="1">
-                <a:solidFill>
-                  <a:srgbClr val="010080"/>
-                </a:solidFill>
-                <a:latin typeface="Source Code Pro" panose="020B0509030403020204" pitchFamily="49" charset="0"/>
-                <a:ea typeface="Source Code Pro" panose="020B0509030403020204" pitchFamily="49" charset="0"/>
-              </a:rPr>
-              <a:t>img</a:t>
-            </a:r>
-            <a:r>
-              <a:rPr lang="fr-FR" sz="1800" dirty="0">
-                <a:solidFill>
-                  <a:srgbClr val="010080"/>
-                </a:solidFill>
-                <a:latin typeface="Source Code Pro" panose="020B0509030403020204" pitchFamily="49" charset="0"/>
-                <a:ea typeface="Source Code Pro" panose="020B0509030403020204" pitchFamily="49" charset="0"/>
-              </a:rPr>
-              <a:t>&gt;</a:t>
+              <a:t> /&gt;</a:t>
             </a:r>
           </a:p>
         </p:txBody>
@@ -10180,36 +10217,1004 @@
           </a:p>
         </p:txBody>
       </p:sp>
-      <p:pic>
-        <p:nvPicPr>
-          <p:cNvPr id="7" name="Image 6">
+      <p:sp>
+        <p:nvSpPr>
+          <p:cNvPr id="8" name="Espace réservé du contenu 2">
             <a:extLst>
               <a:ext uri="{FF2B5EF4-FFF2-40B4-BE49-F238E27FC236}">
-                <a16:creationId xmlns:a16="http://schemas.microsoft.com/office/drawing/2014/main" id="{31ABA225-75D5-7246-9B2A-3E87C43894DF}"/>
+                <a16:creationId xmlns:a16="http://schemas.microsoft.com/office/drawing/2014/main" id="{D3D32C87-7438-D946-8E74-014CCD029CE1}"/>
               </a:ext>
             </a:extLst>
           </p:cNvPr>
-          <p:cNvPicPr>
-            <a:picLocks noChangeAspect="1"/>
-          </p:cNvPicPr>
+          <p:cNvSpPr txBox="1">
+            <a:spLocks/>
+          </p:cNvSpPr>
           <p:nvPr/>
-        </p:nvPicPr>
-        <p:blipFill>
-          <a:blip r:embed="rId2"/>
-          <a:stretch>
-            <a:fillRect/>
-          </a:stretch>
-        </p:blipFill>
+        </p:nvSpPr>
         <p:spPr>
           <a:xfrm>
-            <a:off x="1864320" y="1068636"/>
-            <a:ext cx="4737647" cy="5431165"/>
+            <a:off x="249767" y="965602"/>
+            <a:ext cx="8644466" cy="592666"/>
           </a:xfrm>
           <a:prstGeom prst="rect">
             <a:avLst/>
           </a:prstGeom>
         </p:spPr>
-      </p:pic>
+        <p:txBody>
+          <a:bodyPr vert="horz" lIns="91440" tIns="45720" rIns="91440" bIns="45720" rtlCol="0">
+            <a:normAutofit/>
+          </a:bodyPr>
+          <a:lstStyle>
+            <a:lvl1pPr marL="447675" indent="-447675" algn="l" defTabSz="457200" rtl="0" eaLnBrk="1" latinLnBrk="0" hangingPunct="1">
+              <a:spcBef>
+                <a:spcPct val="20000"/>
+              </a:spcBef>
+              <a:buClr>
+                <a:schemeClr val="accent6"/>
+              </a:buClr>
+              <a:buFont typeface="Brix Slab Bold" pitchFamily="50" charset="0"/>
+              <a:buChar char="→"/>
+              <a:defRPr sz="3200" kern="1200">
+                <a:solidFill>
+                  <a:schemeClr val="tx1"/>
+                </a:solidFill>
+                <a:latin typeface="+mn-lt"/>
+                <a:ea typeface="+mn-ea"/>
+                <a:cs typeface="+mn-cs"/>
+              </a:defRPr>
+            </a:lvl1pPr>
+            <a:lvl2pPr marL="742950" indent="-285750" algn="l" defTabSz="457200" rtl="0" eaLnBrk="1" latinLnBrk="0" hangingPunct="1">
+              <a:spcBef>
+                <a:spcPct val="20000"/>
+              </a:spcBef>
+              <a:buClr>
+                <a:schemeClr val="accent1"/>
+              </a:buClr>
+              <a:buFont typeface="Lucida Grande"/>
+              <a:buChar char="›"/>
+              <a:defRPr sz="2800" kern="1200">
+                <a:solidFill>
+                  <a:schemeClr val="tx1"/>
+                </a:solidFill>
+                <a:latin typeface="+mn-lt"/>
+                <a:ea typeface="+mn-ea"/>
+                <a:cs typeface="+mn-cs"/>
+              </a:defRPr>
+            </a:lvl2pPr>
+            <a:lvl3pPr marL="1143000" indent="-228600" algn="l" defTabSz="457200" rtl="0" eaLnBrk="1" latinLnBrk="0" hangingPunct="1">
+              <a:spcBef>
+                <a:spcPct val="20000"/>
+              </a:spcBef>
+              <a:buClr>
+                <a:schemeClr val="accent6"/>
+              </a:buClr>
+              <a:buFont typeface="Wingdings" charset="2"/>
+              <a:buChar char="§"/>
+              <a:defRPr sz="2400" kern="1200">
+                <a:solidFill>
+                  <a:schemeClr val="tx1"/>
+                </a:solidFill>
+                <a:latin typeface="+mn-lt"/>
+                <a:ea typeface="+mn-ea"/>
+                <a:cs typeface="+mn-cs"/>
+              </a:defRPr>
+            </a:lvl3pPr>
+            <a:lvl4pPr marL="1600200" indent="-228600" algn="l" defTabSz="457200" rtl="0" eaLnBrk="1" latinLnBrk="0" hangingPunct="1">
+              <a:spcBef>
+                <a:spcPct val="20000"/>
+              </a:spcBef>
+              <a:buClr>
+                <a:schemeClr val="accent6"/>
+              </a:buClr>
+              <a:buFont typeface="Wingdings" charset="2"/>
+              <a:buChar char="§"/>
+              <a:defRPr sz="2000" kern="1200">
+                <a:solidFill>
+                  <a:schemeClr val="tx1"/>
+                </a:solidFill>
+                <a:latin typeface="+mn-lt"/>
+                <a:ea typeface="+mn-ea"/>
+                <a:cs typeface="+mn-cs"/>
+              </a:defRPr>
+            </a:lvl4pPr>
+            <a:lvl5pPr marL="2057400" indent="-228600" algn="l" defTabSz="457200" rtl="0" eaLnBrk="1" latinLnBrk="0" hangingPunct="1">
+              <a:spcBef>
+                <a:spcPct val="20000"/>
+              </a:spcBef>
+              <a:buClr>
+                <a:schemeClr val="accent6"/>
+              </a:buClr>
+              <a:buFont typeface="Wingdings" charset="2"/>
+              <a:buChar char="§"/>
+              <a:defRPr sz="2000" kern="1200">
+                <a:solidFill>
+                  <a:schemeClr val="tx1"/>
+                </a:solidFill>
+                <a:latin typeface="+mn-lt"/>
+                <a:ea typeface="+mn-ea"/>
+                <a:cs typeface="+mn-cs"/>
+              </a:defRPr>
+            </a:lvl5pPr>
+            <a:lvl6pPr marL="2514600" indent="-228600" algn="l" defTabSz="457200" rtl="0" eaLnBrk="1" latinLnBrk="0" hangingPunct="1">
+              <a:spcBef>
+                <a:spcPct val="20000"/>
+              </a:spcBef>
+              <a:buFont typeface="Arial"/>
+              <a:buChar char="•"/>
+              <a:defRPr sz="2000" kern="1200">
+                <a:solidFill>
+                  <a:schemeClr val="tx1"/>
+                </a:solidFill>
+                <a:latin typeface="+mn-lt"/>
+                <a:ea typeface="+mn-ea"/>
+                <a:cs typeface="+mn-cs"/>
+              </a:defRPr>
+            </a:lvl6pPr>
+            <a:lvl7pPr marL="2971800" indent="-228600" algn="l" defTabSz="457200" rtl="0" eaLnBrk="1" latinLnBrk="0" hangingPunct="1">
+              <a:spcBef>
+                <a:spcPct val="20000"/>
+              </a:spcBef>
+              <a:buFont typeface="Arial"/>
+              <a:buChar char="•"/>
+              <a:defRPr sz="2000" kern="1200">
+                <a:solidFill>
+                  <a:schemeClr val="tx1"/>
+                </a:solidFill>
+                <a:latin typeface="+mn-lt"/>
+                <a:ea typeface="+mn-ea"/>
+                <a:cs typeface="+mn-cs"/>
+              </a:defRPr>
+            </a:lvl7pPr>
+            <a:lvl8pPr marL="3429000" indent="-228600" algn="l" defTabSz="457200" rtl="0" eaLnBrk="1" latinLnBrk="0" hangingPunct="1">
+              <a:spcBef>
+                <a:spcPct val="20000"/>
+              </a:spcBef>
+              <a:buFont typeface="Arial"/>
+              <a:buChar char="•"/>
+              <a:defRPr sz="2000" kern="1200">
+                <a:solidFill>
+                  <a:schemeClr val="tx1"/>
+                </a:solidFill>
+                <a:latin typeface="+mn-lt"/>
+                <a:ea typeface="+mn-ea"/>
+                <a:cs typeface="+mn-cs"/>
+              </a:defRPr>
+            </a:lvl8pPr>
+            <a:lvl9pPr marL="3886200" indent="-228600" algn="l" defTabSz="457200" rtl="0" eaLnBrk="1" latinLnBrk="0" hangingPunct="1">
+              <a:spcBef>
+                <a:spcPct val="20000"/>
+              </a:spcBef>
+              <a:buFont typeface="Arial"/>
+              <a:buChar char="•"/>
+              <a:defRPr sz="2000" kern="1200">
+                <a:solidFill>
+                  <a:schemeClr val="tx1"/>
+                </a:solidFill>
+                <a:latin typeface="+mn-lt"/>
+                <a:ea typeface="+mn-ea"/>
+                <a:cs typeface="+mn-cs"/>
+              </a:defRPr>
+            </a:lvl9pPr>
+          </a:lstStyle>
+          <a:p>
+            <a:pPr marL="400050" indent="-400050">
+              <a:lnSpc>
+                <a:spcPct val="150000"/>
+              </a:lnSpc>
+            </a:pPr>
+            <a:r>
+              <a:rPr lang="fr-FR" sz="2400" dirty="0"/>
+              <a:t>Éléments sémantiques</a:t>
+            </a:r>
+          </a:p>
+        </p:txBody>
+      </p:sp>
+      <p:sp>
+        <p:nvSpPr>
+          <p:cNvPr id="10" name="Rectangle 9">
+            <a:extLst>
+              <a:ext uri="{FF2B5EF4-FFF2-40B4-BE49-F238E27FC236}">
+                <a16:creationId xmlns:a16="http://schemas.microsoft.com/office/drawing/2014/main" id="{6C729F3D-5FFA-BB40-AB56-CF3F751F3B13}"/>
+              </a:ext>
+            </a:extLst>
+          </p:cNvPr>
+          <p:cNvSpPr/>
+          <p:nvPr/>
+        </p:nvSpPr>
+        <p:spPr>
+          <a:xfrm>
+            <a:off x="2265770" y="1749504"/>
+            <a:ext cx="4612460" cy="4612460"/>
+          </a:xfrm>
+          <a:prstGeom prst="rect">
+            <a:avLst/>
+          </a:prstGeom>
+          <a:ln w="38100">
+            <a:solidFill>
+              <a:schemeClr val="tx1"/>
+            </a:solidFill>
+          </a:ln>
+          <a:effectLst>
+            <a:outerShdw blurRad="101600" sx="101000" sy="101000" algn="ctr" rotWithShape="0">
+              <a:prstClr val="black">
+                <a:alpha val="10000"/>
+              </a:prstClr>
+            </a:outerShdw>
+          </a:effectLst>
+        </p:spPr>
+        <p:style>
+          <a:lnRef idx="2">
+            <a:schemeClr val="accent1"/>
+          </a:lnRef>
+          <a:fillRef idx="1">
+            <a:schemeClr val="lt1"/>
+          </a:fillRef>
+          <a:effectRef idx="0">
+            <a:schemeClr val="accent1"/>
+          </a:effectRef>
+          <a:fontRef idx="minor">
+            <a:schemeClr val="dk1"/>
+          </a:fontRef>
+        </p:style>
+        <p:txBody>
+          <a:bodyPr rtlCol="0" anchor="ctr"/>
+          <a:lstStyle/>
+          <a:p>
+            <a:pPr algn="ctr"/>
+            <a:endParaRPr lang="fr-FR"/>
+          </a:p>
+        </p:txBody>
+      </p:sp>
+      <p:sp>
+        <p:nvSpPr>
+          <p:cNvPr id="11" name="Rectangle 10">
+            <a:extLst>
+              <a:ext uri="{FF2B5EF4-FFF2-40B4-BE49-F238E27FC236}">
+                <a16:creationId xmlns:a16="http://schemas.microsoft.com/office/drawing/2014/main" id="{41922C08-2BA0-504C-AAB9-35ECBD66DB99}"/>
+              </a:ext>
+            </a:extLst>
+          </p:cNvPr>
+          <p:cNvSpPr/>
+          <p:nvPr/>
+        </p:nvSpPr>
+        <p:spPr>
+          <a:xfrm>
+            <a:off x="2418170" y="1901904"/>
+            <a:ext cx="4338679" cy="648711"/>
+          </a:xfrm>
+          <a:prstGeom prst="rect">
+            <a:avLst/>
+          </a:prstGeom>
+          <a:solidFill>
+            <a:schemeClr val="accent6">
+              <a:lumMod val="20000"/>
+              <a:lumOff val="80000"/>
+            </a:schemeClr>
+          </a:solidFill>
+          <a:ln w="19050">
+            <a:solidFill>
+              <a:schemeClr val="tx1"/>
+            </a:solidFill>
+          </a:ln>
+          <a:effectLst>
+            <a:outerShdw blurRad="101600" sx="101000" sy="101000" algn="ctr" rotWithShape="0">
+              <a:prstClr val="black">
+                <a:alpha val="10000"/>
+              </a:prstClr>
+            </a:outerShdw>
+          </a:effectLst>
+        </p:spPr>
+        <p:style>
+          <a:lnRef idx="2">
+            <a:schemeClr val="accent1"/>
+          </a:lnRef>
+          <a:fillRef idx="1">
+            <a:schemeClr val="lt1"/>
+          </a:fillRef>
+          <a:effectRef idx="0">
+            <a:schemeClr val="accent1"/>
+          </a:effectRef>
+          <a:fontRef idx="minor">
+            <a:schemeClr val="dk1"/>
+          </a:fontRef>
+        </p:style>
+        <p:txBody>
+          <a:bodyPr rtlCol="0" anchor="ctr"/>
+          <a:lstStyle/>
+          <a:p>
+            <a:pPr algn="ctr"/>
+            <a:r>
+              <a:rPr lang="fr-FR" sz="1600" dirty="0">
+                <a:latin typeface="Source Code Pro" panose="020B0509030403020204" pitchFamily="49" charset="0"/>
+                <a:ea typeface="Source Code Pro" panose="020B0509030403020204" pitchFamily="49" charset="0"/>
+              </a:rPr>
+              <a:t>&lt;header&gt;</a:t>
+            </a:r>
+          </a:p>
+        </p:txBody>
+      </p:sp>
+      <p:sp>
+        <p:nvSpPr>
+          <p:cNvPr id="12" name="Rectangle 11">
+            <a:extLst>
+              <a:ext uri="{FF2B5EF4-FFF2-40B4-BE49-F238E27FC236}">
+                <a16:creationId xmlns:a16="http://schemas.microsoft.com/office/drawing/2014/main" id="{981914FB-A54C-5B49-AFB6-D6ABF7E9FE69}"/>
+              </a:ext>
+            </a:extLst>
+          </p:cNvPr>
+          <p:cNvSpPr/>
+          <p:nvPr/>
+        </p:nvSpPr>
+        <p:spPr>
+          <a:xfrm>
+            <a:off x="2418170" y="2703015"/>
+            <a:ext cx="956209" cy="1288104"/>
+          </a:xfrm>
+          <a:prstGeom prst="rect">
+            <a:avLst/>
+          </a:prstGeom>
+          <a:solidFill>
+            <a:schemeClr val="accent2"/>
+          </a:solidFill>
+          <a:ln w="19050">
+            <a:solidFill>
+              <a:schemeClr val="tx1"/>
+            </a:solidFill>
+          </a:ln>
+          <a:effectLst>
+            <a:outerShdw blurRad="101600" sx="101000" sy="101000" algn="ctr" rotWithShape="0">
+              <a:prstClr val="black">
+                <a:alpha val="10000"/>
+              </a:prstClr>
+            </a:outerShdw>
+          </a:effectLst>
+        </p:spPr>
+        <p:style>
+          <a:lnRef idx="2">
+            <a:schemeClr val="accent1"/>
+          </a:lnRef>
+          <a:fillRef idx="1">
+            <a:schemeClr val="lt1"/>
+          </a:fillRef>
+          <a:effectRef idx="0">
+            <a:schemeClr val="accent1"/>
+          </a:effectRef>
+          <a:fontRef idx="minor">
+            <a:schemeClr val="dk1"/>
+          </a:fontRef>
+        </p:style>
+        <p:txBody>
+          <a:bodyPr rtlCol="0" anchor="ctr"/>
+          <a:lstStyle/>
+          <a:p>
+            <a:pPr algn="ctr"/>
+            <a:r>
+              <a:rPr lang="fr-FR" sz="1600" dirty="0">
+                <a:latin typeface="Source Code Pro" panose="020B0509030403020204" pitchFamily="49" charset="0"/>
+                <a:ea typeface="Source Code Pro" panose="020B0509030403020204" pitchFamily="49" charset="0"/>
+              </a:rPr>
+              <a:t>&lt;</a:t>
+            </a:r>
+            <a:r>
+              <a:rPr lang="fr-FR" sz="1600" dirty="0" err="1">
+                <a:latin typeface="Source Code Pro" panose="020B0509030403020204" pitchFamily="49" charset="0"/>
+                <a:ea typeface="Source Code Pro" panose="020B0509030403020204" pitchFamily="49" charset="0"/>
+              </a:rPr>
+              <a:t>nav</a:t>
+            </a:r>
+            <a:r>
+              <a:rPr lang="fr-FR" sz="1600" dirty="0">
+                <a:latin typeface="Source Code Pro" panose="020B0509030403020204" pitchFamily="49" charset="0"/>
+                <a:ea typeface="Source Code Pro" panose="020B0509030403020204" pitchFamily="49" charset="0"/>
+              </a:rPr>
+              <a:t>&gt;</a:t>
+            </a:r>
+          </a:p>
+        </p:txBody>
+      </p:sp>
+      <p:sp>
+        <p:nvSpPr>
+          <p:cNvPr id="13" name="Rectangle 12">
+            <a:extLst>
+              <a:ext uri="{FF2B5EF4-FFF2-40B4-BE49-F238E27FC236}">
+                <a16:creationId xmlns:a16="http://schemas.microsoft.com/office/drawing/2014/main" id="{78B5FE9F-5BFC-D84B-8792-19A3A64F5C54}"/>
+              </a:ext>
+            </a:extLst>
+          </p:cNvPr>
+          <p:cNvSpPr/>
+          <p:nvPr/>
+        </p:nvSpPr>
+        <p:spPr>
+          <a:xfrm>
+            <a:off x="3526779" y="2703015"/>
+            <a:ext cx="3230070" cy="1563112"/>
+          </a:xfrm>
+          <a:prstGeom prst="rect">
+            <a:avLst/>
+          </a:prstGeom>
+          <a:solidFill>
+            <a:schemeClr val="bg1">
+              <a:lumMod val="85000"/>
+            </a:schemeClr>
+          </a:solidFill>
+          <a:ln w="19050">
+            <a:solidFill>
+              <a:schemeClr val="tx1"/>
+            </a:solidFill>
+          </a:ln>
+          <a:effectLst>
+            <a:outerShdw blurRad="101600" sx="101000" sy="101000" algn="ctr" rotWithShape="0">
+              <a:prstClr val="black">
+                <a:alpha val="10000"/>
+              </a:prstClr>
+            </a:outerShdw>
+          </a:effectLst>
+        </p:spPr>
+        <p:style>
+          <a:lnRef idx="2">
+            <a:schemeClr val="accent1"/>
+          </a:lnRef>
+          <a:fillRef idx="1">
+            <a:schemeClr val="lt1"/>
+          </a:fillRef>
+          <a:effectRef idx="0">
+            <a:schemeClr val="accent1"/>
+          </a:effectRef>
+          <a:fontRef idx="minor">
+            <a:schemeClr val="dk1"/>
+          </a:fontRef>
+        </p:style>
+        <p:txBody>
+          <a:bodyPr rtlCol="0" anchor="t"/>
+          <a:lstStyle/>
+          <a:p>
+            <a:r>
+              <a:rPr lang="fr-FR" sz="1600" dirty="0">
+                <a:latin typeface="Source Code Pro" panose="020B0509030403020204" pitchFamily="49" charset="0"/>
+                <a:ea typeface="Source Code Pro" panose="020B0509030403020204" pitchFamily="49" charset="0"/>
+              </a:rPr>
+              <a:t>&lt;section&gt;</a:t>
+            </a:r>
+          </a:p>
+        </p:txBody>
+      </p:sp>
+      <p:sp>
+        <p:nvSpPr>
+          <p:cNvPr id="14" name="Rectangle 13">
+            <a:extLst>
+              <a:ext uri="{FF2B5EF4-FFF2-40B4-BE49-F238E27FC236}">
+                <a16:creationId xmlns:a16="http://schemas.microsoft.com/office/drawing/2014/main" id="{FFAB0D85-310B-7348-9961-6B58923CDD5A}"/>
+              </a:ext>
+            </a:extLst>
+          </p:cNvPr>
+          <p:cNvSpPr/>
+          <p:nvPr/>
+        </p:nvSpPr>
+        <p:spPr>
+          <a:xfrm>
+            <a:off x="3526779" y="4347094"/>
+            <a:ext cx="3230070" cy="1084286"/>
+          </a:xfrm>
+          <a:prstGeom prst="rect">
+            <a:avLst/>
+          </a:prstGeom>
+          <a:solidFill>
+            <a:schemeClr val="bg1">
+              <a:lumMod val="85000"/>
+            </a:schemeClr>
+          </a:solidFill>
+          <a:ln w="19050">
+            <a:solidFill>
+              <a:schemeClr val="tx1"/>
+            </a:solidFill>
+          </a:ln>
+          <a:effectLst>
+            <a:outerShdw blurRad="101600" sx="101000" sy="101000" algn="ctr" rotWithShape="0">
+              <a:prstClr val="black">
+                <a:alpha val="10000"/>
+              </a:prstClr>
+            </a:outerShdw>
+          </a:effectLst>
+        </p:spPr>
+        <p:style>
+          <a:lnRef idx="2">
+            <a:schemeClr val="accent1"/>
+          </a:lnRef>
+          <a:fillRef idx="1">
+            <a:schemeClr val="lt1"/>
+          </a:fillRef>
+          <a:effectRef idx="0">
+            <a:schemeClr val="accent1"/>
+          </a:effectRef>
+          <a:fontRef idx="minor">
+            <a:schemeClr val="dk1"/>
+          </a:fontRef>
+        </p:style>
+        <p:txBody>
+          <a:bodyPr rtlCol="0" anchor="t"/>
+          <a:lstStyle/>
+          <a:p>
+            <a:r>
+              <a:rPr lang="fr-FR" sz="1600" dirty="0">
+                <a:latin typeface="Source Code Pro" panose="020B0509030403020204" pitchFamily="49" charset="0"/>
+                <a:ea typeface="Source Code Pro" panose="020B0509030403020204" pitchFamily="49" charset="0"/>
+              </a:rPr>
+              <a:t>&lt;section&gt;</a:t>
+            </a:r>
+          </a:p>
+        </p:txBody>
+      </p:sp>
+      <p:sp>
+        <p:nvSpPr>
+          <p:cNvPr id="15" name="Rectangle 14">
+            <a:extLst>
+              <a:ext uri="{FF2B5EF4-FFF2-40B4-BE49-F238E27FC236}">
+                <a16:creationId xmlns:a16="http://schemas.microsoft.com/office/drawing/2014/main" id="{6D89D1CA-5675-074F-A074-CB265CD569CE}"/>
+              </a:ext>
+            </a:extLst>
+          </p:cNvPr>
+          <p:cNvSpPr/>
+          <p:nvPr/>
+        </p:nvSpPr>
+        <p:spPr>
+          <a:xfrm>
+            <a:off x="2418170" y="5571165"/>
+            <a:ext cx="4338679" cy="648711"/>
+          </a:xfrm>
+          <a:prstGeom prst="rect">
+            <a:avLst/>
+          </a:prstGeom>
+          <a:solidFill>
+            <a:schemeClr val="tx2">
+              <a:lumMod val="40000"/>
+              <a:lumOff val="60000"/>
+            </a:schemeClr>
+          </a:solidFill>
+          <a:ln w="19050">
+            <a:solidFill>
+              <a:schemeClr val="tx1"/>
+            </a:solidFill>
+          </a:ln>
+          <a:effectLst>
+            <a:outerShdw blurRad="101600" sx="101000" sy="101000" algn="ctr" rotWithShape="0">
+              <a:prstClr val="black">
+                <a:alpha val="10000"/>
+              </a:prstClr>
+            </a:outerShdw>
+          </a:effectLst>
+        </p:spPr>
+        <p:style>
+          <a:lnRef idx="2">
+            <a:schemeClr val="accent1"/>
+          </a:lnRef>
+          <a:fillRef idx="1">
+            <a:schemeClr val="lt1"/>
+          </a:fillRef>
+          <a:effectRef idx="0">
+            <a:schemeClr val="accent1"/>
+          </a:effectRef>
+          <a:fontRef idx="minor">
+            <a:schemeClr val="dk1"/>
+          </a:fontRef>
+        </p:style>
+        <p:txBody>
+          <a:bodyPr rtlCol="0" anchor="ctr"/>
+          <a:lstStyle/>
+          <a:p>
+            <a:pPr algn="ctr"/>
+            <a:r>
+              <a:rPr lang="fr-FR" sz="1600" dirty="0">
+                <a:latin typeface="Source Code Pro" panose="020B0509030403020204" pitchFamily="49" charset="0"/>
+                <a:ea typeface="Source Code Pro" panose="020B0509030403020204" pitchFamily="49" charset="0"/>
+              </a:rPr>
+              <a:t>&lt;</a:t>
+            </a:r>
+            <a:r>
+              <a:rPr lang="fr-FR" sz="1600" dirty="0" err="1">
+                <a:latin typeface="Source Code Pro" panose="020B0509030403020204" pitchFamily="49" charset="0"/>
+                <a:ea typeface="Source Code Pro" panose="020B0509030403020204" pitchFamily="49" charset="0"/>
+              </a:rPr>
+              <a:t>footer</a:t>
+            </a:r>
+            <a:r>
+              <a:rPr lang="fr-FR" sz="1600" dirty="0">
+                <a:latin typeface="Source Code Pro" panose="020B0509030403020204" pitchFamily="49" charset="0"/>
+                <a:ea typeface="Source Code Pro" panose="020B0509030403020204" pitchFamily="49" charset="0"/>
+              </a:rPr>
+              <a:t>&gt;</a:t>
+            </a:r>
+          </a:p>
+        </p:txBody>
+      </p:sp>
+      <p:sp>
+        <p:nvSpPr>
+          <p:cNvPr id="16" name="Rectangle 15">
+            <a:extLst>
+              <a:ext uri="{FF2B5EF4-FFF2-40B4-BE49-F238E27FC236}">
+                <a16:creationId xmlns:a16="http://schemas.microsoft.com/office/drawing/2014/main" id="{57DAE0DD-00DD-3446-AFB1-1C1C9B01BE2A}"/>
+              </a:ext>
+            </a:extLst>
+          </p:cNvPr>
+          <p:cNvSpPr/>
+          <p:nvPr/>
+        </p:nvSpPr>
+        <p:spPr>
+          <a:xfrm>
+            <a:off x="3614444" y="3028045"/>
+            <a:ext cx="1896232" cy="1144593"/>
+          </a:xfrm>
+          <a:prstGeom prst="rect">
+            <a:avLst/>
+          </a:prstGeom>
+          <a:solidFill>
+            <a:schemeClr val="accent2">
+              <a:lumMod val="20000"/>
+              <a:lumOff val="80000"/>
+            </a:schemeClr>
+          </a:solidFill>
+          <a:ln w="19050">
+            <a:solidFill>
+              <a:schemeClr val="tx1"/>
+            </a:solidFill>
+          </a:ln>
+          <a:effectLst>
+            <a:outerShdw blurRad="101600" sx="101000" sy="101000" algn="ctr" rotWithShape="0">
+              <a:prstClr val="black">
+                <a:alpha val="10000"/>
+              </a:prstClr>
+            </a:outerShdw>
+          </a:effectLst>
+        </p:spPr>
+        <p:style>
+          <a:lnRef idx="2">
+            <a:schemeClr val="accent1"/>
+          </a:lnRef>
+          <a:fillRef idx="1">
+            <a:schemeClr val="lt1"/>
+          </a:fillRef>
+          <a:effectRef idx="0">
+            <a:schemeClr val="accent1"/>
+          </a:effectRef>
+          <a:fontRef idx="minor">
+            <a:schemeClr val="dk1"/>
+          </a:fontRef>
+        </p:style>
+        <p:txBody>
+          <a:bodyPr rtlCol="0" anchor="ctr"/>
+          <a:lstStyle/>
+          <a:p>
+            <a:pPr algn="ctr"/>
+            <a:r>
+              <a:rPr lang="fr-FR" sz="1600" dirty="0">
+                <a:latin typeface="Source Code Pro" panose="020B0509030403020204" pitchFamily="49" charset="0"/>
+                <a:ea typeface="Source Code Pro" panose="020B0509030403020204" pitchFamily="49" charset="0"/>
+              </a:rPr>
+              <a:t>&lt;article&gt;</a:t>
+            </a:r>
+          </a:p>
+        </p:txBody>
+      </p:sp>
+      <p:sp>
+        <p:nvSpPr>
+          <p:cNvPr id="17" name="Rectangle 16">
+            <a:extLst>
+              <a:ext uri="{FF2B5EF4-FFF2-40B4-BE49-F238E27FC236}">
+                <a16:creationId xmlns:a16="http://schemas.microsoft.com/office/drawing/2014/main" id="{1AC8B646-4937-B441-B8FA-83EFFDE090A5}"/>
+              </a:ext>
+            </a:extLst>
+          </p:cNvPr>
+          <p:cNvSpPr/>
+          <p:nvPr/>
+        </p:nvSpPr>
+        <p:spPr>
+          <a:xfrm>
+            <a:off x="5598341" y="3036812"/>
+            <a:ext cx="1068148" cy="565768"/>
+          </a:xfrm>
+          <a:prstGeom prst="rect">
+            <a:avLst/>
+          </a:prstGeom>
+          <a:solidFill>
+            <a:schemeClr val="accent5">
+              <a:lumMod val="20000"/>
+              <a:lumOff val="80000"/>
+            </a:schemeClr>
+          </a:solidFill>
+          <a:ln w="19050">
+            <a:solidFill>
+              <a:schemeClr val="tx1"/>
+            </a:solidFill>
+          </a:ln>
+          <a:effectLst>
+            <a:outerShdw blurRad="101600" sx="101000" sy="101000" algn="ctr" rotWithShape="0">
+              <a:prstClr val="black">
+                <a:alpha val="10000"/>
+              </a:prstClr>
+            </a:outerShdw>
+          </a:effectLst>
+        </p:spPr>
+        <p:style>
+          <a:lnRef idx="2">
+            <a:schemeClr val="accent1"/>
+          </a:lnRef>
+          <a:fillRef idx="1">
+            <a:schemeClr val="lt1"/>
+          </a:fillRef>
+          <a:effectRef idx="0">
+            <a:schemeClr val="accent1"/>
+          </a:effectRef>
+          <a:fontRef idx="minor">
+            <a:schemeClr val="dk1"/>
+          </a:fontRef>
+        </p:style>
+        <p:txBody>
+          <a:bodyPr rtlCol="0" anchor="ctr"/>
+          <a:lstStyle/>
+          <a:p>
+            <a:pPr algn="ctr"/>
+            <a:r>
+              <a:rPr lang="fr-FR" sz="1600" dirty="0">
+                <a:latin typeface="Source Code Pro" panose="020B0509030403020204" pitchFamily="49" charset="0"/>
+                <a:ea typeface="Source Code Pro" panose="020B0509030403020204" pitchFamily="49" charset="0"/>
+              </a:rPr>
+              <a:t>&lt;</a:t>
+            </a:r>
+            <a:r>
+              <a:rPr lang="fr-FR" sz="1600" dirty="0" err="1">
+                <a:latin typeface="Source Code Pro" panose="020B0509030403020204" pitchFamily="49" charset="0"/>
+                <a:ea typeface="Source Code Pro" panose="020B0509030403020204" pitchFamily="49" charset="0"/>
+              </a:rPr>
+              <a:t>aside</a:t>
+            </a:r>
+            <a:r>
+              <a:rPr lang="fr-FR" sz="1600" dirty="0">
+                <a:latin typeface="Source Code Pro" panose="020B0509030403020204" pitchFamily="49" charset="0"/>
+                <a:ea typeface="Source Code Pro" panose="020B0509030403020204" pitchFamily="49" charset="0"/>
+              </a:rPr>
+              <a:t>&gt;</a:t>
+            </a:r>
+          </a:p>
+        </p:txBody>
+      </p:sp>
+      <p:sp>
+        <p:nvSpPr>
+          <p:cNvPr id="18" name="Rectangle 17">
+            <a:extLst>
+              <a:ext uri="{FF2B5EF4-FFF2-40B4-BE49-F238E27FC236}">
+                <a16:creationId xmlns:a16="http://schemas.microsoft.com/office/drawing/2014/main" id="{340F8B11-8FD3-4C43-A344-346C715B35A5}"/>
+              </a:ext>
+            </a:extLst>
+          </p:cNvPr>
+          <p:cNvSpPr/>
+          <p:nvPr/>
+        </p:nvSpPr>
+        <p:spPr>
+          <a:xfrm>
+            <a:off x="5598341" y="3683547"/>
+            <a:ext cx="1068148" cy="483220"/>
+          </a:xfrm>
+          <a:prstGeom prst="rect">
+            <a:avLst/>
+          </a:prstGeom>
+          <a:solidFill>
+            <a:schemeClr val="accent5">
+              <a:lumMod val="20000"/>
+              <a:lumOff val="80000"/>
+            </a:schemeClr>
+          </a:solidFill>
+          <a:ln w="19050">
+            <a:solidFill>
+              <a:schemeClr val="tx1"/>
+            </a:solidFill>
+          </a:ln>
+          <a:effectLst>
+            <a:outerShdw blurRad="101600" sx="101000" sy="101000" algn="ctr" rotWithShape="0">
+              <a:prstClr val="black">
+                <a:alpha val="10000"/>
+              </a:prstClr>
+            </a:outerShdw>
+          </a:effectLst>
+        </p:spPr>
+        <p:style>
+          <a:lnRef idx="2">
+            <a:schemeClr val="accent1"/>
+          </a:lnRef>
+          <a:fillRef idx="1">
+            <a:schemeClr val="lt1"/>
+          </a:fillRef>
+          <a:effectRef idx="0">
+            <a:schemeClr val="accent1"/>
+          </a:effectRef>
+          <a:fontRef idx="minor">
+            <a:schemeClr val="dk1"/>
+          </a:fontRef>
+        </p:style>
+        <p:txBody>
+          <a:bodyPr rtlCol="0" anchor="ctr"/>
+          <a:lstStyle/>
+          <a:p>
+            <a:pPr algn="ctr"/>
+            <a:r>
+              <a:rPr lang="fr-FR" sz="1600" dirty="0">
+                <a:latin typeface="Source Code Pro" panose="020B0509030403020204" pitchFamily="49" charset="0"/>
+                <a:ea typeface="Source Code Pro" panose="020B0509030403020204" pitchFamily="49" charset="0"/>
+              </a:rPr>
+              <a:t>&lt;</a:t>
+            </a:r>
+            <a:r>
+              <a:rPr lang="fr-FR" sz="1600" dirty="0" err="1">
+                <a:latin typeface="Source Code Pro" panose="020B0509030403020204" pitchFamily="49" charset="0"/>
+                <a:ea typeface="Source Code Pro" panose="020B0509030403020204" pitchFamily="49" charset="0"/>
+              </a:rPr>
+              <a:t>aside</a:t>
+            </a:r>
+            <a:r>
+              <a:rPr lang="fr-FR" sz="1600" dirty="0">
+                <a:latin typeface="Source Code Pro" panose="020B0509030403020204" pitchFamily="49" charset="0"/>
+                <a:ea typeface="Source Code Pro" panose="020B0509030403020204" pitchFamily="49" charset="0"/>
+              </a:rPr>
+              <a:t>&gt;</a:t>
+            </a:r>
+          </a:p>
+        </p:txBody>
+      </p:sp>
+      <p:sp>
+        <p:nvSpPr>
+          <p:cNvPr id="19" name="Rectangle 18">
+            <a:extLst>
+              <a:ext uri="{FF2B5EF4-FFF2-40B4-BE49-F238E27FC236}">
+                <a16:creationId xmlns:a16="http://schemas.microsoft.com/office/drawing/2014/main" id="{93E709C2-3156-6744-81B2-FBCBAC81144E}"/>
+              </a:ext>
+            </a:extLst>
+          </p:cNvPr>
+          <p:cNvSpPr/>
+          <p:nvPr/>
+        </p:nvSpPr>
+        <p:spPr>
+          <a:xfrm>
+            <a:off x="4895681" y="4418527"/>
+            <a:ext cx="1770808" cy="922216"/>
+          </a:xfrm>
+          <a:prstGeom prst="rect">
+            <a:avLst/>
+          </a:prstGeom>
+          <a:solidFill>
+            <a:schemeClr val="accent6">
+              <a:lumMod val="60000"/>
+              <a:lumOff val="40000"/>
+            </a:schemeClr>
+          </a:solidFill>
+          <a:ln w="19050">
+            <a:solidFill>
+              <a:schemeClr val="tx1"/>
+            </a:solidFill>
+          </a:ln>
+          <a:effectLst>
+            <a:outerShdw blurRad="101600" sx="101000" sy="101000" algn="ctr" rotWithShape="0">
+              <a:prstClr val="black">
+                <a:alpha val="10000"/>
+              </a:prstClr>
+            </a:outerShdw>
+          </a:effectLst>
+        </p:spPr>
+        <p:style>
+          <a:lnRef idx="2">
+            <a:schemeClr val="accent1"/>
+          </a:lnRef>
+          <a:fillRef idx="1">
+            <a:schemeClr val="lt1"/>
+          </a:fillRef>
+          <a:effectRef idx="0">
+            <a:schemeClr val="accent1"/>
+          </a:effectRef>
+          <a:fontRef idx="minor">
+            <a:schemeClr val="dk1"/>
+          </a:fontRef>
+        </p:style>
+        <p:txBody>
+          <a:bodyPr rtlCol="0" anchor="ctr"/>
+          <a:lstStyle/>
+          <a:p>
+            <a:pPr algn="ctr"/>
+            <a:r>
+              <a:rPr lang="fr-FR" sz="1600" dirty="0">
+                <a:latin typeface="Source Code Pro" panose="020B0509030403020204" pitchFamily="49" charset="0"/>
+                <a:ea typeface="Source Code Pro" panose="020B0509030403020204" pitchFamily="49" charset="0"/>
+              </a:rPr>
+              <a:t>&lt;figure&gt;</a:t>
+            </a:r>
+          </a:p>
+          <a:p>
+            <a:pPr algn="ctr"/>
+            <a:endParaRPr lang="fr-FR" sz="1600" dirty="0">
+              <a:latin typeface="Source Code Pro" panose="020B0509030403020204" pitchFamily="49" charset="0"/>
+              <a:ea typeface="Source Code Pro" panose="020B0509030403020204" pitchFamily="49" charset="0"/>
+            </a:endParaRPr>
+          </a:p>
+        </p:txBody>
+      </p:sp>
+      <p:sp>
+        <p:nvSpPr>
+          <p:cNvPr id="20" name="Rectangle 19">
+            <a:extLst>
+              <a:ext uri="{FF2B5EF4-FFF2-40B4-BE49-F238E27FC236}">
+                <a16:creationId xmlns:a16="http://schemas.microsoft.com/office/drawing/2014/main" id="{69F0D37F-8736-E247-B2C3-D887B461768C}"/>
+              </a:ext>
+            </a:extLst>
+          </p:cNvPr>
+          <p:cNvSpPr/>
+          <p:nvPr/>
+        </p:nvSpPr>
+        <p:spPr>
+          <a:xfrm>
+            <a:off x="4930445" y="5059066"/>
+            <a:ext cx="1697126" cy="241440"/>
+          </a:xfrm>
+          <a:prstGeom prst="rect">
+            <a:avLst/>
+          </a:prstGeom>
+          <a:solidFill>
+            <a:schemeClr val="accent4">
+              <a:lumMod val="20000"/>
+              <a:lumOff val="80000"/>
+            </a:schemeClr>
+          </a:solidFill>
+          <a:ln w="19050">
+            <a:solidFill>
+              <a:schemeClr val="tx1"/>
+            </a:solidFill>
+          </a:ln>
+          <a:effectLst>
+            <a:outerShdw blurRad="101600" sx="101000" sy="101000" algn="ctr" rotWithShape="0">
+              <a:prstClr val="black">
+                <a:alpha val="10000"/>
+              </a:prstClr>
+            </a:outerShdw>
+          </a:effectLst>
+        </p:spPr>
+        <p:style>
+          <a:lnRef idx="2">
+            <a:schemeClr val="accent1"/>
+          </a:lnRef>
+          <a:fillRef idx="1">
+            <a:schemeClr val="lt1"/>
+          </a:fillRef>
+          <a:effectRef idx="0">
+            <a:schemeClr val="accent1"/>
+          </a:effectRef>
+          <a:fontRef idx="minor">
+            <a:schemeClr val="dk1"/>
+          </a:fontRef>
+        </p:style>
+        <p:txBody>
+          <a:bodyPr rtlCol="0" anchor="ctr"/>
+          <a:lstStyle/>
+          <a:p>
+            <a:pPr algn="ctr"/>
+            <a:r>
+              <a:rPr lang="fr-FR" sz="1400" dirty="0">
+                <a:latin typeface="Source Code Pro" panose="020B0509030403020204" pitchFamily="49" charset="0"/>
+                <a:ea typeface="Source Code Pro" panose="020B0509030403020204" pitchFamily="49" charset="0"/>
+              </a:rPr>
+              <a:t>&lt;</a:t>
+            </a:r>
+            <a:r>
+              <a:rPr lang="fr-FR" sz="1400" dirty="0" err="1">
+                <a:latin typeface="Source Code Pro" panose="020B0509030403020204" pitchFamily="49" charset="0"/>
+                <a:ea typeface="Source Code Pro" panose="020B0509030403020204" pitchFamily="49" charset="0"/>
+              </a:rPr>
+              <a:t>figcaption</a:t>
+            </a:r>
+            <a:r>
+              <a:rPr lang="fr-FR" sz="1400" dirty="0">
+                <a:latin typeface="Source Code Pro" panose="020B0509030403020204" pitchFamily="49" charset="0"/>
+                <a:ea typeface="Source Code Pro" panose="020B0509030403020204" pitchFamily="49" charset="0"/>
+              </a:rPr>
+              <a:t>&gt;</a:t>
+            </a:r>
+          </a:p>
+        </p:txBody>
+      </p:sp>
     </p:spTree>
     <p:extLst>
       <p:ext uri="{BB962C8B-B14F-4D97-AF65-F5344CB8AC3E}">
@@ -10368,7 +11373,7 @@
         </p:nvSpPr>
         <p:spPr>
           <a:xfrm>
-            <a:off x="5610117" y="6019460"/>
+            <a:off x="5610117" y="5444928"/>
             <a:ext cx="1834798" cy="369332"/>
           </a:xfrm>
           <a:prstGeom prst="rect">
@@ -10397,7 +11402,7 @@
         </p:nvSpPr>
         <p:spPr>
           <a:xfrm>
-            <a:off x="648058" y="4436729"/>
+            <a:off x="648058" y="3862197"/>
             <a:ext cx="1569660" cy="369332"/>
           </a:xfrm>
           <a:prstGeom prst="rect">
@@ -10439,7 +11444,7 @@
         </p:blipFill>
         <p:spPr>
           <a:xfrm>
-            <a:off x="754832" y="3047059"/>
+            <a:off x="754832" y="2472527"/>
             <a:ext cx="1349113" cy="1349111"/>
           </a:xfrm>
           <a:prstGeom prst="ellipse">
@@ -10461,7 +11466,7 @@
         </p:nvSpPr>
         <p:spPr>
           <a:xfrm>
-            <a:off x="5905143" y="2611165"/>
+            <a:off x="5905143" y="2036633"/>
             <a:ext cx="1269274" cy="533400"/>
           </a:xfrm>
           <a:prstGeom prst="rect">
@@ -10509,7 +11514,7 @@
         </p:nvSpPr>
         <p:spPr>
           <a:xfrm>
-            <a:off x="5905143" y="3486365"/>
+            <a:off x="5905143" y="2911833"/>
             <a:ext cx="1269274" cy="533400"/>
           </a:xfrm>
           <a:prstGeom prst="rect">
@@ -10557,7 +11562,7 @@
         </p:nvSpPr>
         <p:spPr>
           <a:xfrm>
-            <a:off x="4934799" y="4310975"/>
+            <a:off x="4934799" y="3736443"/>
             <a:ext cx="1269274" cy="533400"/>
           </a:xfrm>
           <a:prstGeom prst="rect">
@@ -10605,7 +11610,7 @@
         </p:nvSpPr>
         <p:spPr>
           <a:xfrm>
-            <a:off x="6861571" y="4310975"/>
+            <a:off x="6861571" y="3736443"/>
             <a:ext cx="1269274" cy="533400"/>
           </a:xfrm>
           <a:prstGeom prst="rect">
@@ -10655,7 +11660,7 @@
         </p:nvCxnSpPr>
         <p:spPr>
           <a:xfrm rot="5400000">
-            <a:off x="5458335" y="3864167"/>
+            <a:off x="5458335" y="3289635"/>
             <a:ext cx="557910" cy="335707"/>
           </a:xfrm>
           <a:prstGeom prst="bentConnector3">
@@ -10697,7 +11702,7 @@
         </p:nvCxnSpPr>
         <p:spPr>
           <a:xfrm>
-            <a:off x="7174417" y="3753065"/>
+            <a:off x="7174417" y="3178533"/>
             <a:ext cx="321791" cy="557910"/>
           </a:xfrm>
           <a:prstGeom prst="bentConnector2">
@@ -10737,7 +11742,7 @@
         </p:nvCxnSpPr>
         <p:spPr>
           <a:xfrm>
-            <a:off x="6539780" y="3144565"/>
+            <a:off x="6539780" y="2570033"/>
             <a:ext cx="0" cy="341800"/>
           </a:xfrm>
           <a:prstGeom prst="line">
@@ -10782,7 +11787,7 @@
         </p:blipFill>
         <p:spPr>
           <a:xfrm>
-            <a:off x="4687217" y="5182658"/>
+            <a:off x="4687217" y="4608126"/>
             <a:ext cx="3705126" cy="716733"/>
           </a:xfrm>
           <a:prstGeom prst="rect">
@@ -10804,7 +11809,7 @@
         </p:nvSpPr>
         <p:spPr>
           <a:xfrm>
-            <a:off x="2532396" y="3423465"/>
+            <a:off x="2532396" y="2848933"/>
             <a:ext cx="1801368" cy="596300"/>
           </a:xfrm>
           <a:prstGeom prst="stripedRightArrow">

</xml_diff>

<commit_message>
Mise à jour des ressources pour la partie Web du bloc 1
</commit_message>
<xml_diff>
--- a/web/2-HTML/html.pptx
+++ b/web/2-HTML/html.pptx
@@ -221,7 +221,7 @@
           <a:p>
             <a:fld id="{5EB47243-285B-2741-8C7D-C88258D9CCFA}" type="datetimeFigureOut">
               <a:rPr lang="fr-FR" smtClean="0"/>
-              <a:t>06/06/2019</a:t>
+              <a:t>07/06/2021</a:t>
             </a:fld>
             <a:endParaRPr lang="fr-FR"/>
           </a:p>
@@ -287,7 +287,7 @@
           <a:p>
             <a:fld id="{C5CA9166-BC48-2C47-B9BF-6F57720E77B8}" type="slidenum">
               <a:rPr lang="fr-FR" smtClean="0"/>
-              <a:t>‹N°›</a:t>
+              <a:t>‹#›</a:t>
             </a:fld>
             <a:endParaRPr lang="fr-FR"/>
           </a:p>
@@ -387,7 +387,7 @@
           <a:p>
             <a:fld id="{7D088D39-B4EA-D24B-B9C3-6A64886EABE2}" type="datetimeFigureOut">
               <a:rPr lang="fr-FR" smtClean="0"/>
-              <a:t>06/06/2019</a:t>
+              <a:t>07/06/2021</a:t>
             </a:fld>
             <a:endParaRPr lang="fr-FR"/>
           </a:p>
@@ -545,7 +545,7 @@
           <a:p>
             <a:fld id="{1C0E2CBA-6097-B848-A7DA-4D7BD6EB303B}" type="slidenum">
               <a:rPr lang="fr-FR" smtClean="0"/>
-              <a:t>‹N°›</a:t>
+              <a:t>‹#›</a:t>
             </a:fld>
             <a:endParaRPr lang="fr-FR"/>
           </a:p>
@@ -713,18 +713,6 @@
             </a:r>
           </a:p>
           <a:p>
-            <a:r>
-              <a:rPr lang="fr-FR" sz="1200" b="0" kern="1200" dirty="0">
-                <a:solidFill>
-                  <a:schemeClr val="tx1"/>
-                </a:solidFill>
-                <a:effectLst/>
-                <a:latin typeface="+mn-lt"/>
-                <a:ea typeface="+mn-ea"/>
-                <a:cs typeface="+mn-cs"/>
-              </a:rPr>
-              <a:t/>
-            </a:r>
             <a:br>
               <a:rPr lang="fr-FR" sz="1200" b="0" kern="1200" dirty="0">
                 <a:solidFill>
@@ -798,18 +786,6 @@
             </a:r>
           </a:p>
           <a:p>
-            <a:r>
-              <a:rPr lang="fr-FR" sz="1200" b="0" kern="1200" dirty="0">
-                <a:solidFill>
-                  <a:schemeClr val="tx1"/>
-                </a:solidFill>
-                <a:effectLst/>
-                <a:latin typeface="+mn-lt"/>
-                <a:ea typeface="+mn-ea"/>
-                <a:cs typeface="+mn-cs"/>
-              </a:rPr>
-              <a:t/>
-            </a:r>
             <a:br>
               <a:rPr lang="fr-FR" sz="1200" b="0" kern="1200" dirty="0">
                 <a:solidFill>
@@ -835,18 +811,6 @@
             </a:r>
           </a:p>
           <a:p>
-            <a:r>
-              <a:rPr lang="fr-FR" sz="1200" b="0" kern="1200" dirty="0">
-                <a:solidFill>
-                  <a:schemeClr val="tx1"/>
-                </a:solidFill>
-                <a:effectLst/>
-                <a:latin typeface="+mn-lt"/>
-                <a:ea typeface="+mn-ea"/>
-                <a:cs typeface="+mn-cs"/>
-              </a:rPr>
-              <a:t/>
-            </a:r>
             <a:br>
               <a:rPr lang="fr-FR" sz="1200" b="0" kern="1200" dirty="0">
                 <a:solidFill>
@@ -1098,18 +1062,6 @@
             </a:r>
           </a:p>
           <a:p>
-            <a:r>
-              <a:rPr lang="fr-FR" sz="1200" b="0" kern="1200" dirty="0">
-                <a:solidFill>
-                  <a:schemeClr val="tx1"/>
-                </a:solidFill>
-                <a:effectLst/>
-                <a:latin typeface="+mn-lt"/>
-                <a:ea typeface="+mn-ea"/>
-                <a:cs typeface="+mn-cs"/>
-              </a:rPr>
-              <a:t/>
-            </a:r>
             <a:br>
               <a:rPr lang="fr-FR" sz="1200" b="0" kern="1200" dirty="0">
                 <a:solidFill>
@@ -1183,18 +1135,6 @@
             </a:r>
           </a:p>
           <a:p>
-            <a:r>
-              <a:rPr lang="fr-FR" sz="1200" b="0" kern="1200" dirty="0">
-                <a:solidFill>
-                  <a:schemeClr val="tx1"/>
-                </a:solidFill>
-                <a:effectLst/>
-                <a:latin typeface="+mn-lt"/>
-                <a:ea typeface="+mn-ea"/>
-                <a:cs typeface="+mn-cs"/>
-              </a:rPr>
-              <a:t/>
-            </a:r>
             <a:br>
               <a:rPr lang="fr-FR" sz="1200" b="0" kern="1200" dirty="0">
                 <a:solidFill>
@@ -1220,18 +1160,6 @@
             </a:r>
           </a:p>
           <a:p>
-            <a:r>
-              <a:rPr lang="fr-FR" sz="1200" b="0" kern="1200" dirty="0">
-                <a:solidFill>
-                  <a:schemeClr val="tx1"/>
-                </a:solidFill>
-                <a:effectLst/>
-                <a:latin typeface="+mn-lt"/>
-                <a:ea typeface="+mn-ea"/>
-                <a:cs typeface="+mn-cs"/>
-              </a:rPr>
-              <a:t/>
-            </a:r>
             <a:br>
               <a:rPr lang="fr-FR" sz="1200" b="0" kern="1200" dirty="0">
                 <a:solidFill>
@@ -1468,6 +1396,160 @@
         <p:txBody>
           <a:bodyPr/>
           <a:lstStyle/>
+          <a:p>
+            <a:pPr marL="0" marR="0" lvl="0" indent="0" algn="l" defTabSz="457200" rtl="0" eaLnBrk="1" fontAlgn="auto" latinLnBrk="0" hangingPunct="1">
+              <a:lnSpc>
+                <a:spcPct val="100000"/>
+              </a:lnSpc>
+              <a:spcBef>
+                <a:spcPts val="0"/>
+              </a:spcBef>
+              <a:spcAft>
+                <a:spcPts val="0"/>
+              </a:spcAft>
+              <a:buClrTx/>
+              <a:buSzTx/>
+              <a:buFontTx/>
+              <a:buNone/>
+              <a:tabLst/>
+              <a:defRPr/>
+            </a:pPr>
+            <a:r>
+              <a:rPr lang="en-US" sz="1200" kern="1200" dirty="0">
+                <a:solidFill>
+                  <a:schemeClr val="tx1"/>
+                </a:solidFill>
+                <a:effectLst/>
+                <a:latin typeface="+mn-lt"/>
+                <a:ea typeface="+mn-ea"/>
+                <a:cs typeface="+mn-cs"/>
+              </a:rPr>
+              <a:t>Un </a:t>
+            </a:r>
+            <a:r>
+              <a:rPr lang="en-US" sz="1200" i="1" kern="1200" dirty="0">
+                <a:solidFill>
+                  <a:schemeClr val="tx1"/>
+                </a:solidFill>
+                <a:effectLst/>
+                <a:latin typeface="+mn-lt"/>
+                <a:ea typeface="+mn-ea"/>
+                <a:cs typeface="+mn-cs"/>
+              </a:rPr>
+              <a:t>block </a:t>
+            </a:r>
+            <a:r>
+              <a:rPr lang="en-US" sz="1200" kern="1200" dirty="0">
+                <a:solidFill>
+                  <a:schemeClr val="tx1"/>
+                </a:solidFill>
+                <a:effectLst/>
+                <a:latin typeface="+mn-lt"/>
+                <a:ea typeface="+mn-ea"/>
+                <a:cs typeface="+mn-cs"/>
+              </a:rPr>
+              <a:t>ne </a:t>
+            </a:r>
+            <a:r>
+              <a:rPr lang="en-US" sz="1200" kern="1200" dirty="0" err="1">
+                <a:solidFill>
+                  <a:schemeClr val="tx1"/>
+                </a:solidFill>
+                <a:effectLst/>
+                <a:latin typeface="+mn-lt"/>
+                <a:ea typeface="+mn-ea"/>
+                <a:cs typeface="+mn-cs"/>
+              </a:rPr>
+              <a:t>peut</a:t>
+            </a:r>
+            <a:r>
+              <a:rPr lang="en-US" sz="1200" kern="1200" dirty="0">
+                <a:solidFill>
+                  <a:schemeClr val="tx1"/>
+                </a:solidFill>
+                <a:effectLst/>
+                <a:latin typeface="+mn-lt"/>
+                <a:ea typeface="+mn-ea"/>
+                <a:cs typeface="+mn-cs"/>
+              </a:rPr>
+              <a:t> pas </a:t>
+            </a:r>
+            <a:r>
+              <a:rPr lang="en-US" sz="1200" kern="1200" dirty="0" err="1">
+                <a:solidFill>
+                  <a:schemeClr val="tx1"/>
+                </a:solidFill>
+                <a:effectLst/>
+                <a:latin typeface="+mn-lt"/>
+                <a:ea typeface="+mn-ea"/>
+                <a:cs typeface="+mn-cs"/>
+              </a:rPr>
+              <a:t>être</a:t>
+            </a:r>
+            <a:r>
+              <a:rPr lang="en-US" sz="1200" kern="1200" dirty="0">
+                <a:solidFill>
+                  <a:schemeClr val="tx1"/>
+                </a:solidFill>
+                <a:effectLst/>
+                <a:latin typeface="+mn-lt"/>
+                <a:ea typeface="+mn-ea"/>
+                <a:cs typeface="+mn-cs"/>
+              </a:rPr>
+              <a:t> </a:t>
+            </a:r>
+            <a:r>
+              <a:rPr lang="en-US" sz="1200" kern="1200" dirty="0" err="1">
+                <a:solidFill>
+                  <a:schemeClr val="tx1"/>
+                </a:solidFill>
+                <a:effectLst/>
+                <a:latin typeface="+mn-lt"/>
+                <a:ea typeface="+mn-ea"/>
+                <a:cs typeface="+mn-cs"/>
+              </a:rPr>
+              <a:t>contenu</a:t>
+            </a:r>
+            <a:r>
+              <a:rPr lang="en-US" sz="1200" kern="1200" dirty="0">
+                <a:solidFill>
+                  <a:schemeClr val="tx1"/>
+                </a:solidFill>
+                <a:effectLst/>
+                <a:latin typeface="+mn-lt"/>
+                <a:ea typeface="+mn-ea"/>
+                <a:cs typeface="+mn-cs"/>
+              </a:rPr>
+              <a:t> dans un </a:t>
+            </a:r>
+            <a:r>
+              <a:rPr lang="en-US" sz="1200" i="1" kern="1200" dirty="0">
+                <a:solidFill>
+                  <a:schemeClr val="tx1"/>
+                </a:solidFill>
+                <a:effectLst/>
+                <a:latin typeface="+mn-lt"/>
+                <a:ea typeface="+mn-ea"/>
+                <a:cs typeface="+mn-cs"/>
+              </a:rPr>
+              <a:t>inline</a:t>
+            </a:r>
+            <a:r>
+              <a:rPr lang="en-US" sz="1200" kern="1200" dirty="0">
+                <a:solidFill>
+                  <a:schemeClr val="tx1"/>
+                </a:solidFill>
+                <a:effectLst/>
+                <a:latin typeface="+mn-lt"/>
+                <a:ea typeface="+mn-ea"/>
+                <a:cs typeface="+mn-cs"/>
+              </a:rPr>
+              <a:t>. </a:t>
+            </a:r>
+            <a:endParaRPr lang="en-US" dirty="0">
+              <a:effectLst/>
+            </a:endParaRPr>
+          </a:p>
           <a:p>
             <a:endParaRPr lang="fr-FR" dirty="0"/>
           </a:p>
@@ -2253,7 +2335,7 @@
           <a:p>
             <a:fld id="{BB2FA04C-1355-4CE6-8050-4BD994E23BD5}" type="datetime4">
               <a:rPr lang="fr-FR" smtClean="0"/>
-              <a:t>6 juin 2019</a:t>
+              <a:t>7 juin 2021</a:t>
             </a:fld>
             <a:endParaRPr lang="fr-FR" dirty="0"/>
           </a:p>
@@ -2331,7 +2413,7 @@
             <a:fld id="{DCE37727-CC04-7A46-938D-2CCFF056F773}" type="slidenum">
               <a:rPr lang="fr-FR" smtClean="0"/>
               <a:pPr/>
-              <a:t>‹N°›</a:t>
+              <a:t>‹#›</a:t>
             </a:fld>
             <a:endParaRPr lang="fr-FR"/>
           </a:p>
@@ -2398,7 +2480,7 @@
           <p:cNvPr id="11" name="Espace réservé du contenu 2">
             <a:extLst>
               <a:ext uri="{FF2B5EF4-FFF2-40B4-BE49-F238E27FC236}">
-                <a16:creationId xmlns:a16="http://schemas.microsoft.com/office/drawing/2014/main" xmlns="" id="{F6B19206-207F-1D47-9B50-2C4BE3DF1AC5}"/>
+                <a16:creationId xmlns:a16="http://schemas.microsoft.com/office/drawing/2014/main" id="{F6B19206-207F-1D47-9B50-2C4BE3DF1AC5}"/>
               </a:ext>
             </a:extLst>
           </p:cNvPr>
@@ -2840,7 +2922,7 @@
           <a:p>
             <a:fld id="{A81C4219-47FF-4375-968D-EABA4A212953}" type="datetime4">
               <a:rPr lang="fr-FR" smtClean="0"/>
-              <a:t>6 juin 2019</a:t>
+              <a:t>7 juin 2021</a:t>
             </a:fld>
             <a:endParaRPr lang="fr-FR" dirty="0"/>
           </a:p>
@@ -2918,7 +3000,7 @@
             <a:fld id="{DCE37727-CC04-7A46-938D-2CCFF056F773}" type="slidenum">
               <a:rPr lang="fr-FR" smtClean="0"/>
               <a:pPr/>
-              <a:t>‹N°›</a:t>
+              <a:t>‹#›</a:t>
             </a:fld>
             <a:endParaRPr lang="fr-FR"/>
           </a:p>
@@ -4676,7 +4758,7 @@
           <a:p>
             <a:fld id="{81E3CCF4-D669-4BB6-B0BE-EE495E88AE6B}" type="datetime4">
               <a:rPr lang="fr-FR" smtClean="0"/>
-              <a:t>6 juin 2019</a:t>
+              <a:t>7 juin 2021</a:t>
             </a:fld>
             <a:endParaRPr lang="fr-FR" dirty="0"/>
           </a:p>
@@ -4754,7 +4836,7 @@
             <a:fld id="{DCE37727-CC04-7A46-938D-2CCFF056F773}" type="slidenum">
               <a:rPr lang="fr-FR" smtClean="0"/>
               <a:pPr/>
-              <a:t>‹N°›</a:t>
+              <a:t>‹#›</a:t>
             </a:fld>
             <a:endParaRPr lang="fr-FR"/>
           </a:p>
@@ -5612,7 +5694,7 @@
           <a:p>
             <a:fld id="{2E52B8B1-858B-4633-AE57-5B6CA9292F2B}" type="datetime4">
               <a:rPr lang="fr-FR" smtClean="0"/>
-              <a:t>6 juin 2019</a:t>
+              <a:t>7 juin 2021</a:t>
             </a:fld>
             <a:endParaRPr lang="fr-FR" dirty="0"/>
           </a:p>
@@ -5690,7 +5772,7 @@
             <a:fld id="{DCE37727-CC04-7A46-938D-2CCFF056F773}" type="slidenum">
               <a:rPr lang="fr-FR" smtClean="0"/>
               <a:pPr/>
-              <a:t>‹N°›</a:t>
+              <a:t>‹#›</a:t>
             </a:fld>
             <a:endParaRPr lang="fr-FR"/>
           </a:p>
@@ -6246,7 +6328,7 @@
           <a:p>
             <a:fld id="{BB2FA04C-1355-4CE6-8050-4BD994E23BD5}" type="datetime4">
               <a:rPr lang="fr-FR" smtClean="0"/>
-              <a:t>6 juin 2019</a:t>
+              <a:t>7 juin 2021</a:t>
             </a:fld>
             <a:endParaRPr lang="fr-FR" dirty="0"/>
           </a:p>
@@ -6559,7 +6641,7 @@
           <a:p>
             <a:fld id="{BB2FA04C-1355-4CE6-8050-4BD994E23BD5}" type="datetime4">
               <a:rPr lang="fr-FR" smtClean="0"/>
-              <a:t>6 juin 2019</a:t>
+              <a:t>7 juin 2021</a:t>
             </a:fld>
             <a:endParaRPr lang="fr-FR" dirty="0"/>
           </a:p>
@@ -6778,7 +6860,7 @@
           <a:p>
             <a:fld id="{1AC11C67-BE04-4C5F-B0EE-E01220C9093A}" type="datetime4">
               <a:rPr lang="fr-FR" smtClean="0"/>
-              <a:t>6 juin 2019</a:t>
+              <a:t>7 juin 2021</a:t>
             </a:fld>
             <a:endParaRPr lang="fr-FR" dirty="0"/>
           </a:p>
@@ -7286,7 +7368,7 @@
           <a:p>
             <a:fld id="{1AC11C67-BE04-4C5F-B0EE-E01220C9093A}" type="datetime4">
               <a:rPr lang="fr-FR" smtClean="0"/>
-              <a:t>6 juin 2019</a:t>
+              <a:t>7 juin 2021</a:t>
             </a:fld>
             <a:endParaRPr lang="fr-FR" dirty="0"/>
           </a:p>
@@ -7359,7 +7441,7 @@
           <p:cNvPr id="7" name="Content Placeholder 2">
             <a:extLst>
               <a:ext uri="{FF2B5EF4-FFF2-40B4-BE49-F238E27FC236}">
-                <a16:creationId xmlns:a16="http://schemas.microsoft.com/office/drawing/2014/main" xmlns="" id="{32ACC363-A4F5-FA47-B02B-455FB20A5D4A}"/>
+                <a16:creationId xmlns:a16="http://schemas.microsoft.com/office/drawing/2014/main" id="{32ACC363-A4F5-FA47-B02B-455FB20A5D4A}"/>
               </a:ext>
             </a:extLst>
           </p:cNvPr>
@@ -7957,7 +8039,7 @@
           <p:cNvPr id="2" name="Titre 1">
             <a:extLst>
               <a:ext uri="{FF2B5EF4-FFF2-40B4-BE49-F238E27FC236}">
-                <a16:creationId xmlns:a16="http://schemas.microsoft.com/office/drawing/2014/main" xmlns="" id="{05733B6D-2CBC-7B4B-8A18-9383AA02B5B1}"/>
+                <a16:creationId xmlns:a16="http://schemas.microsoft.com/office/drawing/2014/main" id="{05733B6D-2CBC-7B4B-8A18-9383AA02B5B1}"/>
               </a:ext>
             </a:extLst>
           </p:cNvPr>
@@ -7987,7 +8069,7 @@
           <p:cNvPr id="3" name="Espace réservé de la date 2">
             <a:extLst>
               <a:ext uri="{FF2B5EF4-FFF2-40B4-BE49-F238E27FC236}">
-                <a16:creationId xmlns:a16="http://schemas.microsoft.com/office/drawing/2014/main" xmlns="" id="{2CDF9B9D-5795-5548-81FD-A8AD4BFD8121}"/>
+                <a16:creationId xmlns:a16="http://schemas.microsoft.com/office/drawing/2014/main" id="{2CDF9B9D-5795-5548-81FD-A8AD4BFD8121}"/>
               </a:ext>
             </a:extLst>
           </p:cNvPr>
@@ -8005,7 +8087,7 @@
           <a:p>
             <a:fld id="{BB2FA04C-1355-4CE6-8050-4BD994E23BD5}" type="datetime4">
               <a:rPr lang="fr-FR" smtClean="0"/>
-              <a:t>6 juin 2019</a:t>
+              <a:t>7 juin 2021</a:t>
             </a:fld>
             <a:endParaRPr lang="fr-FR" dirty="0"/>
           </a:p>
@@ -8016,7 +8098,7 @@
           <p:cNvPr id="4" name="Espace réservé du pied de page 3">
             <a:extLst>
               <a:ext uri="{FF2B5EF4-FFF2-40B4-BE49-F238E27FC236}">
-                <a16:creationId xmlns:a16="http://schemas.microsoft.com/office/drawing/2014/main" xmlns="" id="{C5115089-3748-7D45-BB01-0327C21F77B3}"/>
+                <a16:creationId xmlns:a16="http://schemas.microsoft.com/office/drawing/2014/main" id="{C5115089-3748-7D45-BB01-0327C21F77B3}"/>
               </a:ext>
             </a:extLst>
           </p:cNvPr>
@@ -8044,7 +8126,7 @@
           <p:cNvPr id="5" name="Espace réservé du numéro de diapositive 4">
             <a:extLst>
               <a:ext uri="{FF2B5EF4-FFF2-40B4-BE49-F238E27FC236}">
-                <a16:creationId xmlns:a16="http://schemas.microsoft.com/office/drawing/2014/main" xmlns="" id="{5F234828-EE5C-374E-BC5B-D120F9354D62}"/>
+                <a16:creationId xmlns:a16="http://schemas.microsoft.com/office/drawing/2014/main" id="{5F234828-EE5C-374E-BC5B-D120F9354D62}"/>
               </a:ext>
             </a:extLst>
           </p:cNvPr>
@@ -8074,7 +8156,7 @@
           <p:cNvPr id="6" name="Espace réservé du contenu 5">
             <a:extLst>
               <a:ext uri="{FF2B5EF4-FFF2-40B4-BE49-F238E27FC236}">
-                <a16:creationId xmlns:a16="http://schemas.microsoft.com/office/drawing/2014/main" xmlns="" id="{9C2E4A32-1AA4-694E-BFD7-44B23AB4F9B2}"/>
+                <a16:creationId xmlns:a16="http://schemas.microsoft.com/office/drawing/2014/main" id="{9C2E4A32-1AA4-694E-BFD7-44B23AB4F9B2}"/>
               </a:ext>
             </a:extLst>
           </p:cNvPr>
@@ -8181,7 +8263,7 @@
           <p:cNvPr id="7" name="Content Placeholder 2">
             <a:extLst>
               <a:ext uri="{FF2B5EF4-FFF2-40B4-BE49-F238E27FC236}">
-                <a16:creationId xmlns:a16="http://schemas.microsoft.com/office/drawing/2014/main" xmlns="" id="{8C96B7D5-2BC4-5C47-B3AA-EAA129B0EC31}"/>
+                <a16:creationId xmlns:a16="http://schemas.microsoft.com/office/drawing/2014/main" id="{8C96B7D5-2BC4-5C47-B3AA-EAA129B0EC31}"/>
               </a:ext>
             </a:extLst>
           </p:cNvPr>
@@ -8457,7 +8539,7 @@
           <p:cNvPr id="8" name="Content Placeholder 2">
             <a:extLst>
               <a:ext uri="{FF2B5EF4-FFF2-40B4-BE49-F238E27FC236}">
-                <a16:creationId xmlns:a16="http://schemas.microsoft.com/office/drawing/2014/main" xmlns="" id="{3DC13ADD-8389-CE49-A1BC-C8721C94BD91}"/>
+                <a16:creationId xmlns:a16="http://schemas.microsoft.com/office/drawing/2014/main" id="{3DC13ADD-8389-CE49-A1BC-C8721C94BD91}"/>
               </a:ext>
             </a:extLst>
           </p:cNvPr>
@@ -8803,7 +8885,7 @@
           <p:cNvPr id="9" name="Image 8">
             <a:extLst>
               <a:ext uri="{FF2B5EF4-FFF2-40B4-BE49-F238E27FC236}">
-                <a16:creationId xmlns:a16="http://schemas.microsoft.com/office/drawing/2014/main" xmlns="" id="{BE364B84-8F74-D645-9286-54CB7335EB6E}"/>
+                <a16:creationId xmlns:a16="http://schemas.microsoft.com/office/drawing/2014/main" id="{BE364B84-8F74-D645-9286-54CB7335EB6E}"/>
               </a:ext>
             </a:extLst>
           </p:cNvPr>
@@ -8832,7 +8914,7 @@
           <p:cNvPr id="10" name="Content Placeholder 2">
             <a:extLst>
               <a:ext uri="{FF2B5EF4-FFF2-40B4-BE49-F238E27FC236}">
-                <a16:creationId xmlns:a16="http://schemas.microsoft.com/office/drawing/2014/main" xmlns="" id="{6A10D8B4-D665-3A4C-99EC-75A4A9470AFF}"/>
+                <a16:creationId xmlns:a16="http://schemas.microsoft.com/office/drawing/2014/main" id="{6A10D8B4-D665-3A4C-99EC-75A4A9470AFF}"/>
               </a:ext>
             </a:extLst>
           </p:cNvPr>
@@ -9158,7 +9240,7 @@
           <p:cNvPr id="2" name="Titre 1">
             <a:extLst>
               <a:ext uri="{FF2B5EF4-FFF2-40B4-BE49-F238E27FC236}">
-                <a16:creationId xmlns:a16="http://schemas.microsoft.com/office/drawing/2014/main" xmlns="" id="{35CB7796-5198-5C48-ABF8-0D0858C36010}"/>
+                <a16:creationId xmlns:a16="http://schemas.microsoft.com/office/drawing/2014/main" id="{35CB7796-5198-5C48-ABF8-0D0858C36010}"/>
               </a:ext>
             </a:extLst>
           </p:cNvPr>
@@ -9188,7 +9270,7 @@
           <p:cNvPr id="3" name="Espace réservé de la date 2">
             <a:extLst>
               <a:ext uri="{FF2B5EF4-FFF2-40B4-BE49-F238E27FC236}">
-                <a16:creationId xmlns:a16="http://schemas.microsoft.com/office/drawing/2014/main" xmlns="" id="{EDD5F539-46F3-BF41-823C-DE3E38473ECF}"/>
+                <a16:creationId xmlns:a16="http://schemas.microsoft.com/office/drawing/2014/main" id="{EDD5F539-46F3-BF41-823C-DE3E38473ECF}"/>
               </a:ext>
             </a:extLst>
           </p:cNvPr>
@@ -9206,7 +9288,7 @@
           <a:p>
             <a:fld id="{BB2FA04C-1355-4CE6-8050-4BD994E23BD5}" type="datetime4">
               <a:rPr lang="fr-FR" smtClean="0"/>
-              <a:t>6 juin 2019</a:t>
+              <a:t>7 juin 2021</a:t>
             </a:fld>
             <a:endParaRPr lang="fr-FR" dirty="0"/>
           </a:p>
@@ -9217,7 +9299,7 @@
           <p:cNvPr id="4" name="Espace réservé du pied de page 3">
             <a:extLst>
               <a:ext uri="{FF2B5EF4-FFF2-40B4-BE49-F238E27FC236}">
-                <a16:creationId xmlns:a16="http://schemas.microsoft.com/office/drawing/2014/main" xmlns="" id="{23DFFBB3-9F99-BA4C-B0A9-49D48608D6E6}"/>
+                <a16:creationId xmlns:a16="http://schemas.microsoft.com/office/drawing/2014/main" id="{23DFFBB3-9F99-BA4C-B0A9-49D48608D6E6}"/>
               </a:ext>
             </a:extLst>
           </p:cNvPr>
@@ -9245,7 +9327,7 @@
           <p:cNvPr id="5" name="Espace réservé du numéro de diapositive 4">
             <a:extLst>
               <a:ext uri="{FF2B5EF4-FFF2-40B4-BE49-F238E27FC236}">
-                <a16:creationId xmlns:a16="http://schemas.microsoft.com/office/drawing/2014/main" xmlns="" id="{296702AF-3368-A54A-9ACB-1DFE22EA4476}"/>
+                <a16:creationId xmlns:a16="http://schemas.microsoft.com/office/drawing/2014/main" id="{296702AF-3368-A54A-9ACB-1DFE22EA4476}"/>
               </a:ext>
             </a:extLst>
           </p:cNvPr>
@@ -9275,7 +9357,7 @@
           <p:cNvPr id="6" name="Espace réservé du contenu 5">
             <a:extLst>
               <a:ext uri="{FF2B5EF4-FFF2-40B4-BE49-F238E27FC236}">
-                <a16:creationId xmlns:a16="http://schemas.microsoft.com/office/drawing/2014/main" xmlns="" id="{A5C8B1A3-9340-EA40-835B-D7A9A6213AFC}"/>
+                <a16:creationId xmlns:a16="http://schemas.microsoft.com/office/drawing/2014/main" id="{A5C8B1A3-9340-EA40-835B-D7A9A6213AFC}"/>
               </a:ext>
             </a:extLst>
           </p:cNvPr>
@@ -9293,7 +9375,15 @@
           <a:p>
             <a:r>
               <a:rPr lang="fr-FR" dirty="0"/>
-              <a:t>Division de pages</a:t>
+              <a:t>Division de pages (</a:t>
+            </a:r>
+            <a:r>
+              <a:rPr lang="fr-FR" i="1" dirty="0"/>
+              <a:t>block</a:t>
+            </a:r>
+            <a:r>
+              <a:rPr lang="fr-FR" dirty="0"/>
+              <a:t>)</a:t>
             </a:r>
           </a:p>
           <a:p>
@@ -9399,7 +9489,15 @@
             </a:pPr>
             <a:r>
               <a:rPr lang="fr-FR" dirty="0"/>
-              <a:t>Division de lignes</a:t>
+              <a:t>Division de lignes (</a:t>
+            </a:r>
+            <a:r>
+              <a:rPr lang="fr-FR" i="1" dirty="0" err="1"/>
+              <a:t>inline</a:t>
+            </a:r>
+            <a:r>
+              <a:rPr lang="fr-FR" dirty="0"/>
+              <a:t>)</a:t>
             </a:r>
           </a:p>
           <a:p>
@@ -9437,7 +9535,51 @@
                   <a:srgbClr val="990100"/>
                 </a:solidFill>
               </a:rPr>
+              <a:t>&gt; </a:t>
+            </a:r>
+            <a:r>
+              <a:rPr lang="fr-FR" dirty="0"/>
+              <a:t>mais aussi</a:t>
+            </a:r>
+            <a:r>
+              <a:rPr lang="fr-FR" dirty="0">
+                <a:solidFill>
+                  <a:srgbClr val="990100"/>
+                </a:solidFill>
+              </a:rPr>
+              <a:t> &lt;a&gt;</a:t>
+            </a:r>
+            <a:r>
+              <a:rPr lang="fr-FR" dirty="0"/>
+              <a:t>, </a:t>
+            </a:r>
+            <a:r>
+              <a:rPr lang="fr-FR" dirty="0">
+                <a:solidFill>
+                  <a:srgbClr val="990100"/>
+                </a:solidFill>
+              </a:rPr>
+              <a:t>&lt;</a:t>
+            </a:r>
+            <a:r>
+              <a:rPr lang="fr-FR" dirty="0" err="1">
+                <a:solidFill>
+                  <a:srgbClr val="990100"/>
+                </a:solidFill>
+              </a:rPr>
+              <a:t>em</a:t>
+            </a:r>
+            <a:r>
+              <a:rPr lang="fr-FR" dirty="0">
+                <a:solidFill>
+                  <a:srgbClr val="990100"/>
+                </a:solidFill>
+              </a:rPr>
               <a:t>&gt;</a:t>
+            </a:r>
+            <a:r>
+              <a:rPr lang="fr-FR" dirty="0"/>
+              <a:t>...</a:t>
             </a:r>
           </a:p>
           <a:p>
@@ -9740,7 +9882,7 @@
           <a:p>
             <a:fld id="{BB2FA04C-1355-4CE6-8050-4BD994E23BD5}" type="datetime4">
               <a:rPr lang="fr-FR" smtClean="0"/>
-              <a:t>6 juin 2019</a:t>
+              <a:t>7 juin 2021</a:t>
             </a:fld>
             <a:endParaRPr lang="fr-FR" dirty="0"/>
           </a:p>
@@ -9813,7 +9955,7 @@
           <p:cNvPr id="7" name="Content Placeholder 2">
             <a:extLst>
               <a:ext uri="{FF2B5EF4-FFF2-40B4-BE49-F238E27FC236}">
-                <a16:creationId xmlns:a16="http://schemas.microsoft.com/office/drawing/2014/main" xmlns="" id="{192A1CA3-AEFF-D046-AD37-9E0509DD9054}"/>
+                <a16:creationId xmlns:a16="http://schemas.microsoft.com/office/drawing/2014/main" id="{192A1CA3-AEFF-D046-AD37-9E0509DD9054}"/>
               </a:ext>
             </a:extLst>
           </p:cNvPr>
@@ -10189,7 +10331,7 @@
           <p:cNvPr id="2" name="Titre 1">
             <a:extLst>
               <a:ext uri="{FF2B5EF4-FFF2-40B4-BE49-F238E27FC236}">
-                <a16:creationId xmlns:a16="http://schemas.microsoft.com/office/drawing/2014/main" xmlns="" id="{F1E93161-A5EB-7D41-8FD8-1E986F2D7708}"/>
+                <a16:creationId xmlns:a16="http://schemas.microsoft.com/office/drawing/2014/main" id="{F1E93161-A5EB-7D41-8FD8-1E986F2D7708}"/>
               </a:ext>
             </a:extLst>
           </p:cNvPr>
@@ -10219,7 +10361,7 @@
           <p:cNvPr id="3" name="Espace réservé de la date 2">
             <a:extLst>
               <a:ext uri="{FF2B5EF4-FFF2-40B4-BE49-F238E27FC236}">
-                <a16:creationId xmlns:a16="http://schemas.microsoft.com/office/drawing/2014/main" xmlns="" id="{272F9163-3B83-1849-874D-86FF41A36859}"/>
+                <a16:creationId xmlns:a16="http://schemas.microsoft.com/office/drawing/2014/main" id="{272F9163-3B83-1849-874D-86FF41A36859}"/>
               </a:ext>
             </a:extLst>
           </p:cNvPr>
@@ -10237,7 +10379,7 @@
           <a:p>
             <a:fld id="{BB2FA04C-1355-4CE6-8050-4BD994E23BD5}" type="datetime4">
               <a:rPr lang="fr-FR" smtClean="0"/>
-              <a:t>6 juin 2019</a:t>
+              <a:t>7 juin 2021</a:t>
             </a:fld>
             <a:endParaRPr lang="fr-FR" dirty="0"/>
           </a:p>
@@ -10248,7 +10390,7 @@
           <p:cNvPr id="4" name="Espace réservé du pied de page 3">
             <a:extLst>
               <a:ext uri="{FF2B5EF4-FFF2-40B4-BE49-F238E27FC236}">
-                <a16:creationId xmlns:a16="http://schemas.microsoft.com/office/drawing/2014/main" xmlns="" id="{97CB9B25-B212-764B-B550-A7597B4192CB}"/>
+                <a16:creationId xmlns:a16="http://schemas.microsoft.com/office/drawing/2014/main" id="{97CB9B25-B212-764B-B550-A7597B4192CB}"/>
               </a:ext>
             </a:extLst>
           </p:cNvPr>
@@ -10276,7 +10418,7 @@
           <p:cNvPr id="5" name="Espace réservé du numéro de diapositive 4">
             <a:extLst>
               <a:ext uri="{FF2B5EF4-FFF2-40B4-BE49-F238E27FC236}">
-                <a16:creationId xmlns:a16="http://schemas.microsoft.com/office/drawing/2014/main" xmlns="" id="{6A49E1A6-BEAE-3045-BD6D-A3C46FA869C0}"/>
+                <a16:creationId xmlns:a16="http://schemas.microsoft.com/office/drawing/2014/main" id="{6A49E1A6-BEAE-3045-BD6D-A3C46FA869C0}"/>
               </a:ext>
             </a:extLst>
           </p:cNvPr>
@@ -10306,7 +10448,7 @@
           <p:cNvPr id="8" name="Espace réservé du contenu 2">
             <a:extLst>
               <a:ext uri="{FF2B5EF4-FFF2-40B4-BE49-F238E27FC236}">
-                <a16:creationId xmlns:a16="http://schemas.microsoft.com/office/drawing/2014/main" xmlns="" id="{D3D32C87-7438-D946-8E74-014CCD029CE1}"/>
+                <a16:creationId xmlns:a16="http://schemas.microsoft.com/office/drawing/2014/main" id="{D3D32C87-7438-D946-8E74-014CCD029CE1}"/>
               </a:ext>
             </a:extLst>
           </p:cNvPr>
@@ -10326,7 +10468,7 @@
         </p:spPr>
         <p:txBody>
           <a:bodyPr vert="horz" lIns="91440" tIns="45720" rIns="91440" bIns="45720" rtlCol="0">
-            <a:normAutofit fontScale="92500" lnSpcReduction="10000"/>
+            <a:normAutofit/>
           </a:bodyPr>
           <a:lstStyle>
             <a:lvl1pPr marL="447675" indent="-447675" algn="l" defTabSz="457200" rtl="0" eaLnBrk="1" latinLnBrk="0" hangingPunct="1">
@@ -10488,8 +10630,13 @@
             </a:pPr>
             <a:r>
               <a:rPr lang="fr-FR" sz="2400" dirty="0"/>
-              <a:t>Éléments sémantiques</a:t>
-            </a:r>
+              <a:t>Éléments sémantiques + nouveau type </a:t>
+            </a:r>
+            <a:r>
+              <a:rPr lang="fr-FR" sz="2400" i="1" dirty="0" err="1"/>
+              <a:t>flex</a:t>
+            </a:r>
+            <a:endParaRPr lang="fr-FR" sz="2400" i="1" dirty="0"/>
           </a:p>
         </p:txBody>
       </p:sp>
@@ -10498,7 +10645,7 @@
           <p:cNvPr id="10" name="Rectangle 9">
             <a:extLst>
               <a:ext uri="{FF2B5EF4-FFF2-40B4-BE49-F238E27FC236}">
-                <a16:creationId xmlns:a16="http://schemas.microsoft.com/office/drawing/2014/main" xmlns="" id="{6C729F3D-5FFA-BB40-AB56-CF3F751F3B13}"/>
+                <a16:creationId xmlns:a16="http://schemas.microsoft.com/office/drawing/2014/main" id="{6C729F3D-5FFA-BB40-AB56-CF3F751F3B13}"/>
               </a:ext>
             </a:extLst>
           </p:cNvPr>
@@ -10554,7 +10701,7 @@
           <p:cNvPr id="11" name="Rectangle 10">
             <a:extLst>
               <a:ext uri="{FF2B5EF4-FFF2-40B4-BE49-F238E27FC236}">
-                <a16:creationId xmlns:a16="http://schemas.microsoft.com/office/drawing/2014/main" xmlns="" id="{41922C08-2BA0-504C-AAB9-35ECBD66DB99}"/>
+                <a16:creationId xmlns:a16="http://schemas.microsoft.com/office/drawing/2014/main" id="{41922C08-2BA0-504C-AAB9-35ECBD66DB99}"/>
               </a:ext>
             </a:extLst>
           </p:cNvPr>
@@ -10622,7 +10769,7 @@
           <p:cNvPr id="12" name="Rectangle 11">
             <a:extLst>
               <a:ext uri="{FF2B5EF4-FFF2-40B4-BE49-F238E27FC236}">
-                <a16:creationId xmlns:a16="http://schemas.microsoft.com/office/drawing/2014/main" xmlns="" id="{981914FB-A54C-5B49-AFB6-D6ABF7E9FE69}"/>
+                <a16:creationId xmlns:a16="http://schemas.microsoft.com/office/drawing/2014/main" id="{981914FB-A54C-5B49-AFB6-D6ABF7E9FE69}"/>
               </a:ext>
             </a:extLst>
           </p:cNvPr>
@@ -10701,7 +10848,7 @@
           <p:cNvPr id="13" name="Rectangle 12">
             <a:extLst>
               <a:ext uri="{FF2B5EF4-FFF2-40B4-BE49-F238E27FC236}">
-                <a16:creationId xmlns:a16="http://schemas.microsoft.com/office/drawing/2014/main" xmlns="" id="{78B5FE9F-5BFC-D84B-8792-19A3A64F5C54}"/>
+                <a16:creationId xmlns:a16="http://schemas.microsoft.com/office/drawing/2014/main" id="{78B5FE9F-5BFC-D84B-8792-19A3A64F5C54}"/>
               </a:ext>
             </a:extLst>
           </p:cNvPr>
@@ -10767,7 +10914,7 @@
           <p:cNvPr id="14" name="Rectangle 13">
             <a:extLst>
               <a:ext uri="{FF2B5EF4-FFF2-40B4-BE49-F238E27FC236}">
-                <a16:creationId xmlns:a16="http://schemas.microsoft.com/office/drawing/2014/main" xmlns="" id="{FFAB0D85-310B-7348-9961-6B58923CDD5A}"/>
+                <a16:creationId xmlns:a16="http://schemas.microsoft.com/office/drawing/2014/main" id="{FFAB0D85-310B-7348-9961-6B58923CDD5A}"/>
               </a:ext>
             </a:extLst>
           </p:cNvPr>
@@ -10833,7 +10980,7 @@
           <p:cNvPr id="15" name="Rectangle 14">
             <a:extLst>
               <a:ext uri="{FF2B5EF4-FFF2-40B4-BE49-F238E27FC236}">
-                <a16:creationId xmlns:a16="http://schemas.microsoft.com/office/drawing/2014/main" xmlns="" id="{6D89D1CA-5675-074F-A074-CB265CD569CE}"/>
+                <a16:creationId xmlns:a16="http://schemas.microsoft.com/office/drawing/2014/main" id="{6D89D1CA-5675-074F-A074-CB265CD569CE}"/>
               </a:ext>
             </a:extLst>
           </p:cNvPr>
@@ -10915,7 +11062,7 @@
           <p:cNvPr id="16" name="Rectangle 15">
             <a:extLst>
               <a:ext uri="{FF2B5EF4-FFF2-40B4-BE49-F238E27FC236}">
-                <a16:creationId xmlns:a16="http://schemas.microsoft.com/office/drawing/2014/main" xmlns="" id="{57DAE0DD-00DD-3446-AFB1-1C1C9B01BE2A}"/>
+                <a16:creationId xmlns:a16="http://schemas.microsoft.com/office/drawing/2014/main" id="{57DAE0DD-00DD-3446-AFB1-1C1C9B01BE2A}"/>
               </a:ext>
             </a:extLst>
           </p:cNvPr>
@@ -10983,7 +11130,7 @@
           <p:cNvPr id="17" name="Rectangle 16">
             <a:extLst>
               <a:ext uri="{FF2B5EF4-FFF2-40B4-BE49-F238E27FC236}">
-                <a16:creationId xmlns:a16="http://schemas.microsoft.com/office/drawing/2014/main" xmlns="" id="{1AC8B646-4937-B441-B8FA-83EFFDE090A5}"/>
+                <a16:creationId xmlns:a16="http://schemas.microsoft.com/office/drawing/2014/main" id="{1AC8B646-4937-B441-B8FA-83EFFDE090A5}"/>
               </a:ext>
             </a:extLst>
           </p:cNvPr>
@@ -11065,7 +11212,7 @@
           <p:cNvPr id="18" name="Rectangle 17">
             <a:extLst>
               <a:ext uri="{FF2B5EF4-FFF2-40B4-BE49-F238E27FC236}">
-                <a16:creationId xmlns:a16="http://schemas.microsoft.com/office/drawing/2014/main" xmlns="" id="{340F8B11-8FD3-4C43-A344-346C715B35A5}"/>
+                <a16:creationId xmlns:a16="http://schemas.microsoft.com/office/drawing/2014/main" id="{340F8B11-8FD3-4C43-A344-346C715B35A5}"/>
               </a:ext>
             </a:extLst>
           </p:cNvPr>
@@ -11147,7 +11294,7 @@
           <p:cNvPr id="19" name="Rectangle 18">
             <a:extLst>
               <a:ext uri="{FF2B5EF4-FFF2-40B4-BE49-F238E27FC236}">
-                <a16:creationId xmlns:a16="http://schemas.microsoft.com/office/drawing/2014/main" xmlns="" id="{93E709C2-3156-6744-81B2-FBCBAC81144E}"/>
+                <a16:creationId xmlns:a16="http://schemas.microsoft.com/office/drawing/2014/main" id="{93E709C2-3156-6744-81B2-FBCBAC81144E}"/>
               </a:ext>
             </a:extLst>
           </p:cNvPr>
@@ -11222,7 +11369,7 @@
           <p:cNvPr id="20" name="Rectangle 19">
             <a:extLst>
               <a:ext uri="{FF2B5EF4-FFF2-40B4-BE49-F238E27FC236}">
-                <a16:creationId xmlns:a16="http://schemas.microsoft.com/office/drawing/2014/main" xmlns="" id="{69F0D37F-8736-E247-B2C3-D887B461768C}"/>
+                <a16:creationId xmlns:a16="http://schemas.microsoft.com/office/drawing/2014/main" id="{69F0D37F-8736-E247-B2C3-D887B461768C}"/>
               </a:ext>
             </a:extLst>
           </p:cNvPr>
@@ -11383,7 +11530,7 @@
           <a:p>
             <a:fld id="{BB2FA04C-1355-4CE6-8050-4BD994E23BD5}" type="datetime4">
               <a:rPr lang="fr-FR" smtClean="0"/>
-              <a:t>6 juin 2019</a:t>
+              <a:t>7 juin 2021</a:t>
             </a:fld>
             <a:endParaRPr lang="fr-FR" dirty="0"/>
           </a:p>
@@ -11514,7 +11661,7 @@
           <p:cNvPr id="25" name="Image 8">
             <a:extLst>
               <a:ext uri="{FF2B5EF4-FFF2-40B4-BE49-F238E27FC236}">
-                <a16:creationId xmlns:a16="http://schemas.microsoft.com/office/drawing/2014/main" xmlns="" id="{3393BEB4-1965-484C-BE0F-A02E46EE3A7A}"/>
+                <a16:creationId xmlns:a16="http://schemas.microsoft.com/office/drawing/2014/main" id="{3393BEB4-1965-484C-BE0F-A02E46EE3A7A}"/>
               </a:ext>
             </a:extLst>
           </p:cNvPr>
@@ -11543,7 +11690,7 @@
           <p:cNvPr id="13" name="Rectangle 12">
             <a:extLst>
               <a:ext uri="{FF2B5EF4-FFF2-40B4-BE49-F238E27FC236}">
-                <a16:creationId xmlns:a16="http://schemas.microsoft.com/office/drawing/2014/main" xmlns="" id="{6CFBF260-5C92-BF4E-877B-97127F2EE8C9}"/>
+                <a16:creationId xmlns:a16="http://schemas.microsoft.com/office/drawing/2014/main" id="{6CFBF260-5C92-BF4E-877B-97127F2EE8C9}"/>
               </a:ext>
             </a:extLst>
           </p:cNvPr>
@@ -11591,7 +11738,7 @@
           <p:cNvPr id="27" name="Rectangle 26">
             <a:extLst>
               <a:ext uri="{FF2B5EF4-FFF2-40B4-BE49-F238E27FC236}">
-                <a16:creationId xmlns:a16="http://schemas.microsoft.com/office/drawing/2014/main" xmlns="" id="{86EC2CF6-3E41-F245-8E9B-6D29C9D7C76D}"/>
+                <a16:creationId xmlns:a16="http://schemas.microsoft.com/office/drawing/2014/main" id="{86EC2CF6-3E41-F245-8E9B-6D29C9D7C76D}"/>
               </a:ext>
             </a:extLst>
           </p:cNvPr>
@@ -11639,7 +11786,7 @@
           <p:cNvPr id="28" name="Rectangle 27">
             <a:extLst>
               <a:ext uri="{FF2B5EF4-FFF2-40B4-BE49-F238E27FC236}">
-                <a16:creationId xmlns:a16="http://schemas.microsoft.com/office/drawing/2014/main" xmlns="" id="{EA20DA71-7467-CC4E-91B7-9C5DAAABA291}"/>
+                <a16:creationId xmlns:a16="http://schemas.microsoft.com/office/drawing/2014/main" id="{EA20DA71-7467-CC4E-91B7-9C5DAAABA291}"/>
               </a:ext>
             </a:extLst>
           </p:cNvPr>
@@ -11687,7 +11834,7 @@
           <p:cNvPr id="29" name="Rectangle 28">
             <a:extLst>
               <a:ext uri="{FF2B5EF4-FFF2-40B4-BE49-F238E27FC236}">
-                <a16:creationId xmlns:a16="http://schemas.microsoft.com/office/drawing/2014/main" xmlns="" id="{DD0214C6-9C96-6F44-A3A0-59A9CE8FB07C}"/>
+                <a16:creationId xmlns:a16="http://schemas.microsoft.com/office/drawing/2014/main" id="{DD0214C6-9C96-6F44-A3A0-59A9CE8FB07C}"/>
               </a:ext>
             </a:extLst>
           </p:cNvPr>
@@ -11735,7 +11882,7 @@
           <p:cNvPr id="30" name="Elbow Connector 29">
             <a:extLst>
               <a:ext uri="{FF2B5EF4-FFF2-40B4-BE49-F238E27FC236}">
-                <a16:creationId xmlns:a16="http://schemas.microsoft.com/office/drawing/2014/main" xmlns="" id="{834DC7F2-C709-5743-8B53-99FD622FF952}"/>
+                <a16:creationId xmlns:a16="http://schemas.microsoft.com/office/drawing/2014/main" id="{834DC7F2-C709-5743-8B53-99FD622FF952}"/>
               </a:ext>
             </a:extLst>
           </p:cNvPr>
@@ -11776,7 +11923,7 @@
           <p:cNvPr id="33" name="Elbow Connector 32">
             <a:extLst>
               <a:ext uri="{FF2B5EF4-FFF2-40B4-BE49-F238E27FC236}">
-                <a16:creationId xmlns:a16="http://schemas.microsoft.com/office/drawing/2014/main" xmlns="" id="{A943769E-302A-E742-B21F-10915E97DAF8}"/>
+                <a16:creationId xmlns:a16="http://schemas.microsoft.com/office/drawing/2014/main" id="{A943769E-302A-E742-B21F-10915E97DAF8}"/>
               </a:ext>
             </a:extLst>
           </p:cNvPr>
@@ -11816,7 +11963,7 @@
           <p:cNvPr id="35" name="Straight Connector 34">
             <a:extLst>
               <a:ext uri="{FF2B5EF4-FFF2-40B4-BE49-F238E27FC236}">
-                <a16:creationId xmlns:a16="http://schemas.microsoft.com/office/drawing/2014/main" xmlns="" id="{6CDFA5F0-0EC6-CB49-B319-861E6706EBE8}"/>
+                <a16:creationId xmlns:a16="http://schemas.microsoft.com/office/drawing/2014/main" id="{6CDFA5F0-0EC6-CB49-B319-861E6706EBE8}"/>
               </a:ext>
             </a:extLst>
           </p:cNvPr>
@@ -11856,7 +12003,7 @@
           <p:cNvPr id="36" name="Image 35">
             <a:extLst>
               <a:ext uri="{FF2B5EF4-FFF2-40B4-BE49-F238E27FC236}">
-                <a16:creationId xmlns:a16="http://schemas.microsoft.com/office/drawing/2014/main" xmlns="" id="{30C663D5-D30A-EF42-A576-B4F864A81218}"/>
+                <a16:creationId xmlns:a16="http://schemas.microsoft.com/office/drawing/2014/main" id="{30C663D5-D30A-EF42-A576-B4F864A81218}"/>
               </a:ext>
             </a:extLst>
           </p:cNvPr>
@@ -11886,7 +12033,7 @@
           <p:cNvPr id="3" name="Flèche droite rayée 2">
             <a:extLst>
               <a:ext uri="{FF2B5EF4-FFF2-40B4-BE49-F238E27FC236}">
-                <a16:creationId xmlns:a16="http://schemas.microsoft.com/office/drawing/2014/main" xmlns="" id="{51576967-EB52-0940-9675-34B95358CEB8}"/>
+                <a16:creationId xmlns:a16="http://schemas.microsoft.com/office/drawing/2014/main" id="{51576967-EB52-0940-9675-34B95358CEB8}"/>
               </a:ext>
             </a:extLst>
           </p:cNvPr>

</xml_diff>

<commit_message>
Mise à jour diapos Web
</commit_message>
<xml_diff>
--- a/web/2-HTML/html.pptx
+++ b/web/2-HTML/html.pptx
@@ -221,7 +221,7 @@
           <a:p>
             <a:fld id="{5EB47243-285B-2741-8C7D-C88258D9CCFA}" type="datetimeFigureOut">
               <a:rPr lang="fr-FR" smtClean="0"/>
-              <a:t>07/06/2021</a:t>
+              <a:t>15/06/2021</a:t>
             </a:fld>
             <a:endParaRPr lang="fr-FR"/>
           </a:p>
@@ -387,7 +387,7 @@
           <a:p>
             <a:fld id="{7D088D39-B4EA-D24B-B9C3-6A64886EABE2}" type="datetimeFigureOut">
               <a:rPr lang="fr-FR" smtClean="0"/>
-              <a:t>07/06/2021</a:t>
+              <a:t>15/06/2021</a:t>
             </a:fld>
             <a:endParaRPr lang="fr-FR"/>
           </a:p>
@@ -2335,7 +2335,7 @@
           <a:p>
             <a:fld id="{BB2FA04C-1355-4CE6-8050-4BD994E23BD5}" type="datetime4">
               <a:rPr lang="fr-FR" smtClean="0"/>
-              <a:t>7 juin 2021</a:t>
+              <a:t>15 juin 2021</a:t>
             </a:fld>
             <a:endParaRPr lang="fr-FR" dirty="0"/>
           </a:p>
@@ -2922,7 +2922,7 @@
           <a:p>
             <a:fld id="{A81C4219-47FF-4375-968D-EABA4A212953}" type="datetime4">
               <a:rPr lang="fr-FR" smtClean="0"/>
-              <a:t>7 juin 2021</a:t>
+              <a:t>15 juin 2021</a:t>
             </a:fld>
             <a:endParaRPr lang="fr-FR" dirty="0"/>
           </a:p>
@@ -4758,7 +4758,7 @@
           <a:p>
             <a:fld id="{81E3CCF4-D669-4BB6-B0BE-EE495E88AE6B}" type="datetime4">
               <a:rPr lang="fr-FR" smtClean="0"/>
-              <a:t>7 juin 2021</a:t>
+              <a:t>15 juin 2021</a:t>
             </a:fld>
             <a:endParaRPr lang="fr-FR" dirty="0"/>
           </a:p>
@@ -5694,7 +5694,7 @@
           <a:p>
             <a:fld id="{2E52B8B1-858B-4633-AE57-5B6CA9292F2B}" type="datetime4">
               <a:rPr lang="fr-FR" smtClean="0"/>
-              <a:t>7 juin 2021</a:t>
+              <a:t>15 juin 2021</a:t>
             </a:fld>
             <a:endParaRPr lang="fr-FR" dirty="0"/>
           </a:p>
@@ -6328,7 +6328,7 @@
           <a:p>
             <a:fld id="{BB2FA04C-1355-4CE6-8050-4BD994E23BD5}" type="datetime4">
               <a:rPr lang="fr-FR" smtClean="0"/>
-              <a:t>7 juin 2021</a:t>
+              <a:t>15 juin 2021</a:t>
             </a:fld>
             <a:endParaRPr lang="fr-FR" dirty="0"/>
           </a:p>
@@ -6641,7 +6641,7 @@
           <a:p>
             <a:fld id="{BB2FA04C-1355-4CE6-8050-4BD994E23BD5}" type="datetime4">
               <a:rPr lang="fr-FR" smtClean="0"/>
-              <a:t>7 juin 2021</a:t>
+              <a:t>15 juin 2021</a:t>
             </a:fld>
             <a:endParaRPr lang="fr-FR" dirty="0"/>
           </a:p>
@@ -6778,7 +6778,7 @@
           <a:p>
             <a:r>
               <a:rPr lang="fr-FR" dirty="0"/>
-              <a:t>Bloc 1</a:t>
+              <a:t>Bloc 1 - Web</a:t>
             </a:r>
           </a:p>
         </p:txBody>
@@ -6860,7 +6860,7 @@
           <a:p>
             <a:fld id="{1AC11C67-BE04-4C5F-B0EE-E01220C9093A}" type="datetime4">
               <a:rPr lang="fr-FR" smtClean="0"/>
-              <a:t>7 juin 2021</a:t>
+              <a:t>15 juin 2021</a:t>
             </a:fld>
             <a:endParaRPr lang="fr-FR" dirty="0"/>
           </a:p>
@@ -7368,7 +7368,7 @@
           <a:p>
             <a:fld id="{1AC11C67-BE04-4C5F-B0EE-E01220C9093A}" type="datetime4">
               <a:rPr lang="fr-FR" smtClean="0"/>
-              <a:t>7 juin 2021</a:t>
+              <a:t>15 juin 2021</a:t>
             </a:fld>
             <a:endParaRPr lang="fr-FR" dirty="0"/>
           </a:p>
@@ -8087,7 +8087,7 @@
           <a:p>
             <a:fld id="{BB2FA04C-1355-4CE6-8050-4BD994E23BD5}" type="datetime4">
               <a:rPr lang="fr-FR" smtClean="0"/>
-              <a:t>7 juin 2021</a:t>
+              <a:t>15 juin 2021</a:t>
             </a:fld>
             <a:endParaRPr lang="fr-FR" dirty="0"/>
           </a:p>
@@ -9288,7 +9288,7 @@
           <a:p>
             <a:fld id="{BB2FA04C-1355-4CE6-8050-4BD994E23BD5}" type="datetime4">
               <a:rPr lang="fr-FR" smtClean="0"/>
-              <a:t>7 juin 2021</a:t>
+              <a:t>15 juin 2021</a:t>
             </a:fld>
             <a:endParaRPr lang="fr-FR" dirty="0"/>
           </a:p>
@@ -9463,7 +9463,7 @@
                   <a:srgbClr val="990100"/>
                 </a:solidFill>
               </a:rPr>
-              <a:t>/&gt;</a:t>
+              <a:t>&gt;</a:t>
             </a:r>
           </a:p>
           <a:p>
@@ -9882,7 +9882,7 @@
           <a:p>
             <a:fld id="{BB2FA04C-1355-4CE6-8050-4BD994E23BD5}" type="datetime4">
               <a:rPr lang="fr-FR" smtClean="0"/>
-              <a:t>7 juin 2021</a:t>
+              <a:t>15 juin 2021</a:t>
             </a:fld>
             <a:endParaRPr lang="fr-FR" dirty="0"/>
           </a:p>
@@ -10291,7 +10291,7 @@
                 <a:latin typeface="Source Code Pro" panose="020B0509030403020204" pitchFamily="49" charset="0"/>
                 <a:ea typeface="Source Code Pro" panose="020B0509030403020204" pitchFamily="49" charset="0"/>
               </a:rPr>
-              <a:t> /&gt;</a:t>
+              <a:t>&gt;</a:t>
             </a:r>
           </a:p>
         </p:txBody>
@@ -10379,7 +10379,7 @@
           <a:p>
             <a:fld id="{BB2FA04C-1355-4CE6-8050-4BD994E23BD5}" type="datetime4">
               <a:rPr lang="fr-FR" smtClean="0"/>
-              <a:t>7 juin 2021</a:t>
+              <a:t>15 juin 2021</a:t>
             </a:fld>
             <a:endParaRPr lang="fr-FR" dirty="0"/>
           </a:p>
@@ -11530,7 +11530,7 @@
           <a:p>
             <a:fld id="{BB2FA04C-1355-4CE6-8050-4BD994E23BD5}" type="datetime4">
               <a:rPr lang="fr-FR" smtClean="0"/>
-              <a:t>7 juin 2021</a:t>
+              <a:t>15 juin 2021</a:t>
             </a:fld>
             <a:endParaRPr lang="fr-FR" dirty="0"/>
           </a:p>

</xml_diff>

<commit_message>
Mise à jour ressources Web
</commit_message>
<xml_diff>
--- a/web/2-HTML/html.pptx
+++ b/web/2-HTML/html.pptx
@@ -221,7 +221,7 @@
           <a:p>
             <a:fld id="{5EB47243-285B-2741-8C7D-C88258D9CCFA}" type="datetimeFigureOut">
               <a:rPr lang="fr-FR" smtClean="0"/>
-              <a:t>15/06/2021</a:t>
+              <a:t>17/06/2021</a:t>
             </a:fld>
             <a:endParaRPr lang="fr-FR"/>
           </a:p>
@@ -387,7 +387,7 @@
           <a:p>
             <a:fld id="{7D088D39-B4EA-D24B-B9C3-6A64886EABE2}" type="datetimeFigureOut">
               <a:rPr lang="fr-FR" smtClean="0"/>
-              <a:t>15/06/2021</a:t>
+              <a:t>17/06/2021</a:t>
             </a:fld>
             <a:endParaRPr lang="fr-FR"/>
           </a:p>
@@ -2335,7 +2335,7 @@
           <a:p>
             <a:fld id="{BB2FA04C-1355-4CE6-8050-4BD994E23BD5}" type="datetime4">
               <a:rPr lang="fr-FR" smtClean="0"/>
-              <a:t>15 juin 2021</a:t>
+              <a:t>17 juin 2021</a:t>
             </a:fld>
             <a:endParaRPr lang="fr-FR" dirty="0"/>
           </a:p>
@@ -2922,7 +2922,7 @@
           <a:p>
             <a:fld id="{A81C4219-47FF-4375-968D-EABA4A212953}" type="datetime4">
               <a:rPr lang="fr-FR" smtClean="0"/>
-              <a:t>15 juin 2021</a:t>
+              <a:t>17 juin 2021</a:t>
             </a:fld>
             <a:endParaRPr lang="fr-FR" dirty="0"/>
           </a:p>
@@ -4758,7 +4758,7 @@
           <a:p>
             <a:fld id="{81E3CCF4-D669-4BB6-B0BE-EE495E88AE6B}" type="datetime4">
               <a:rPr lang="fr-FR" smtClean="0"/>
-              <a:t>15 juin 2021</a:t>
+              <a:t>17 juin 2021</a:t>
             </a:fld>
             <a:endParaRPr lang="fr-FR" dirty="0"/>
           </a:p>
@@ -5694,7 +5694,7 @@
           <a:p>
             <a:fld id="{2E52B8B1-858B-4633-AE57-5B6CA9292F2B}" type="datetime4">
               <a:rPr lang="fr-FR" smtClean="0"/>
-              <a:t>15 juin 2021</a:t>
+              <a:t>17 juin 2021</a:t>
             </a:fld>
             <a:endParaRPr lang="fr-FR" dirty="0"/>
           </a:p>
@@ -6328,7 +6328,7 @@
           <a:p>
             <a:fld id="{BB2FA04C-1355-4CE6-8050-4BD994E23BD5}" type="datetime4">
               <a:rPr lang="fr-FR" smtClean="0"/>
-              <a:t>15 juin 2021</a:t>
+              <a:t>17 juin 2021</a:t>
             </a:fld>
             <a:endParaRPr lang="fr-FR" dirty="0"/>
           </a:p>
@@ -6641,7 +6641,7 @@
           <a:p>
             <a:fld id="{BB2FA04C-1355-4CE6-8050-4BD994E23BD5}" type="datetime4">
               <a:rPr lang="fr-FR" smtClean="0"/>
-              <a:t>15 juin 2021</a:t>
+              <a:t>17 juin 2021</a:t>
             </a:fld>
             <a:endParaRPr lang="fr-FR" dirty="0"/>
           </a:p>
@@ -6860,7 +6860,7 @@
           <a:p>
             <a:fld id="{1AC11C67-BE04-4C5F-B0EE-E01220C9093A}" type="datetime4">
               <a:rPr lang="fr-FR" smtClean="0"/>
-              <a:t>15 juin 2021</a:t>
+              <a:t>17 juin 2021</a:t>
             </a:fld>
             <a:endParaRPr lang="fr-FR" dirty="0"/>
           </a:p>
@@ -7368,7 +7368,7 @@
           <a:p>
             <a:fld id="{1AC11C67-BE04-4C5F-B0EE-E01220C9093A}" type="datetime4">
               <a:rPr lang="fr-FR" smtClean="0"/>
-              <a:t>15 juin 2021</a:t>
+              <a:t>17 juin 2021</a:t>
             </a:fld>
             <a:endParaRPr lang="fr-FR" dirty="0"/>
           </a:p>
@@ -7823,7 +7823,7 @@
                 <a:latin typeface="Source Code Pro" panose="020B0509030403020204" pitchFamily="49" charset="0"/>
                 <a:ea typeface="Source Code Pro" panose="020B0509030403020204" pitchFamily="49" charset="0"/>
               </a:rPr>
-              <a:t>" /&gt; </a:t>
+              <a:t>"&gt; </a:t>
             </a:r>
           </a:p>
           <a:p>
@@ -8087,7 +8087,7 @@
           <a:p>
             <a:fld id="{BB2FA04C-1355-4CE6-8050-4BD994E23BD5}" type="datetime4">
               <a:rPr lang="fr-FR" smtClean="0"/>
-              <a:t>15 juin 2021</a:t>
+              <a:t>17 juin 2021</a:t>
             </a:fld>
             <a:endParaRPr lang="fr-FR" dirty="0"/>
           </a:p>
@@ -8735,7 +8735,7 @@
                 <a:latin typeface="Source Code Pro" panose="020B0509030403020204" pitchFamily="49" charset="0"/>
                 <a:ea typeface="Source Code Pro" panose="020B0509030403020204" pitchFamily="49" charset="0"/>
               </a:rPr>
-              <a:t>&lt;a</a:t>
+              <a:t>&lt;div</a:t>
             </a:r>
             <a:r>
               <a:rPr lang="fr-FR" sz="1800" dirty="0">
@@ -8765,7 +8765,7 @@
                 <a:latin typeface="Source Code Pro" panose="020B0509030403020204" pitchFamily="49" charset="0"/>
                 <a:ea typeface="Source Code Pro" panose="020B0509030403020204" pitchFamily="49" charset="0"/>
               </a:rPr>
-              <a:t>"intro" </a:t>
+              <a:t>"intro"</a:t>
             </a:r>
             <a:r>
               <a:rPr lang="fr-FR" sz="1800" dirty="0">
@@ -8775,7 +8775,27 @@
                 <a:latin typeface="Source Code Pro" panose="020B0509030403020204" pitchFamily="49" charset="0"/>
                 <a:ea typeface="Source Code Pro" panose="020B0509030403020204" pitchFamily="49" charset="0"/>
               </a:rPr>
-              <a:t>/&gt;</a:t>
+              <a:t>&gt; </a:t>
+            </a:r>
+            <a:r>
+              <a:rPr lang="fr-FR" sz="1800" dirty="0">
+                <a:solidFill>
+                  <a:srgbClr val="657B83"/>
+                </a:solidFill>
+                <a:latin typeface="Source Code Pro" panose="020B0509030403020204" pitchFamily="49" charset="0"/>
+                <a:ea typeface="Source Code Pro" panose="020B0509030403020204" pitchFamily="49" charset="0"/>
+              </a:rPr>
+              <a:t>...</a:t>
+            </a:r>
+            <a:r>
+              <a:rPr lang="fr-FR" sz="1800" dirty="0">
+                <a:solidFill>
+                  <a:srgbClr val="010080"/>
+                </a:solidFill>
+                <a:latin typeface="Source Code Pro" panose="020B0509030403020204" pitchFamily="49" charset="0"/>
+                <a:ea typeface="Source Code Pro" panose="020B0509030403020204" pitchFamily="49" charset="0"/>
+              </a:rPr>
+              <a:t> &lt;/div&gt;</a:t>
             </a:r>
           </a:p>
           <a:p>
@@ -8865,7 +8885,7 @@
                 <a:latin typeface="Source Code Pro" panose="020B0509030403020204" pitchFamily="49" charset="0"/>
                 <a:ea typeface="Source Code Pro" panose="020B0509030403020204" pitchFamily="49" charset="0"/>
               </a:rPr>
-              <a:t>Introduction</a:t>
+              <a:t>Retour à l’introduction</a:t>
             </a:r>
             <a:r>
               <a:rPr lang="fr-FR" sz="1800" dirty="0">
@@ -9288,7 +9308,7 @@
           <a:p>
             <a:fld id="{BB2FA04C-1355-4CE6-8050-4BD994E23BD5}" type="datetime4">
               <a:rPr lang="fr-FR" smtClean="0"/>
-              <a:t>15 juin 2021</a:t>
+              <a:t>17 juin 2021</a:t>
             </a:fld>
             <a:endParaRPr lang="fr-FR" dirty="0"/>
           </a:p>
@@ -9882,7 +9902,7 @@
           <a:p>
             <a:fld id="{BB2FA04C-1355-4CE6-8050-4BD994E23BD5}" type="datetime4">
               <a:rPr lang="fr-FR" smtClean="0"/>
-              <a:t>15 juin 2021</a:t>
+              <a:t>17 juin 2021</a:t>
             </a:fld>
             <a:endParaRPr lang="fr-FR" dirty="0"/>
           </a:p>
@@ -10379,7 +10399,7 @@
           <a:p>
             <a:fld id="{BB2FA04C-1355-4CE6-8050-4BD994E23BD5}" type="datetime4">
               <a:rPr lang="fr-FR" smtClean="0"/>
-              <a:t>15 juin 2021</a:t>
+              <a:t>17 juin 2021</a:t>
             </a:fld>
             <a:endParaRPr lang="fr-FR" dirty="0"/>
           </a:p>
@@ -11530,7 +11550,7 @@
           <a:p>
             <a:fld id="{BB2FA04C-1355-4CE6-8050-4BD994E23BD5}" type="datetime4">
               <a:rPr lang="fr-FR" smtClean="0"/>
-              <a:t>15 juin 2021</a:t>
+              <a:t>17 juin 2021</a:t>
             </a:fld>
             <a:endParaRPr lang="fr-FR" dirty="0"/>
           </a:p>

</xml_diff>